<commit_message>
Add docker and python samples
</commit_message>
<xml_diff>
--- a/docs/spark-diagrams.pptx
+++ b/docs/spark-diagrams.pptx
@@ -6,13 +6,14 @@
     <p:sldMasterId id="2147483943" r:id="rId2"/>
   </p:sldMasterIdLst>
   <p:notesMasterIdLst>
-    <p:notesMasterId r:id="rId4"/>
+    <p:notesMasterId r:id="rId5"/>
   </p:notesMasterIdLst>
   <p:handoutMasterIdLst>
-    <p:handoutMasterId r:id="rId5"/>
+    <p:handoutMasterId r:id="rId6"/>
   </p:handoutMasterIdLst>
   <p:sldIdLst>
     <p:sldId id="141168470" r:id="rId3"/>
+    <p:sldId id="141168471" r:id="rId4"/>
   </p:sldIdLst>
   <p:sldSz cx="9144000" cy="5143500" type="screen16x9"/>
   <p:notesSz cx="6858000" cy="9144000"/>
@@ -215,7 +216,7 @@
           <a:p>
             <a:fld id="{43B1B1F9-D0CB-FF4D-BEE0-BED1F1FDA196}" type="datetimeFigureOut">
               <a:rPr lang="en-US" smtClean="0"/>
-              <a:t>9/4/19</a:t>
+              <a:t>12/31/19</a:t>
             </a:fld>
             <a:endParaRPr lang="en-US"/>
           </a:p>
@@ -380,7 +381,7 @@
           <a:p>
             <a:fld id="{26BE012A-D992-5D42-B86E-AA2BC0764EE1}" type="datetimeFigureOut">
               <a:rPr lang="en-US" smtClean="0"/>
-              <a:t>9/4/19</a:t>
+              <a:t>12/31/19</a:t>
             </a:fld>
             <a:endParaRPr lang="en-US"/>
           </a:p>
@@ -2965,14 +2966,14 @@
           </a:ln>
           <a:extLst>
             <a:ext uri="{909E8E84-426E-40dd-AFC4-6F175D3DCCD1}">
-              <a14:hiddenFill xmlns:a14="http://schemas.microsoft.com/office/drawing/2010/main" xmlns="">
+              <a14:hiddenFill xmlns="" xmlns:a14="http://schemas.microsoft.com/office/drawing/2010/main">
                 <a:solidFill>
                   <a:srgbClr val="FFFFFF"/>
                 </a:solidFill>
               </a14:hiddenFill>
             </a:ext>
             <a:ext uri="{91240B29-F687-4f45-9708-019B960494DF}">
-              <a14:hiddenLine xmlns:a14="http://schemas.microsoft.com/office/drawing/2010/main" xmlns="" w="9525">
+              <a14:hiddenLine xmlns="" xmlns:a14="http://schemas.microsoft.com/office/drawing/2010/main" w="9525">
                 <a:solidFill>
                   <a:srgbClr val="000000"/>
                 </a:solidFill>
@@ -3024,14 +3025,14 @@
           <a:effectLst/>
           <a:extLst>
             <a:ext uri="{909E8E84-426E-40dd-AFC4-6F175D3DCCD1}">
-              <a14:hiddenFill xmlns:a14="http://schemas.microsoft.com/office/drawing/2010/main" xmlns="">
+              <a14:hiddenFill xmlns="" xmlns:a14="http://schemas.microsoft.com/office/drawing/2010/main">
                 <a:solidFill>
                   <a:schemeClr val="accent1"/>
                 </a:solidFill>
               </a14:hiddenFill>
             </a:ext>
             <a:ext uri="{91240B29-F687-4f45-9708-019B960494DF}">
-              <a14:hiddenLine xmlns:a14="http://schemas.microsoft.com/office/drawing/2010/main" xmlns="" w="9525">
+              <a14:hiddenLine xmlns="" xmlns:a14="http://schemas.microsoft.com/office/drawing/2010/main" w="9525">
                 <a:solidFill>
                   <a:schemeClr val="tx1"/>
                 </a:solidFill>
@@ -3041,7 +3042,7 @@
               </a14:hiddenLine>
             </a:ext>
             <a:ext uri="{AF507438-7753-43e0-B8FC-AC1667EBCBE1}">
-              <a14:hiddenEffects xmlns:a14="http://schemas.microsoft.com/office/drawing/2010/main" xmlns="">
+              <a14:hiddenEffects xmlns="" xmlns:a14="http://schemas.microsoft.com/office/drawing/2010/main">
                 <a:effectLst>
                   <a:outerShdw blurRad="63500" dist="38099" dir="2700000" algn="ctr" rotWithShape="0">
                     <a:schemeClr val="bg2">
@@ -3811,10 +3812,10 @@
           </a:ln>
           <a:extLst>
             <a:ext uri="{FAA26D3D-D897-4be2-8F04-BA451C77F1D7}">
-              <ma14:placeholderFlag xmlns="" xmlns:ma14="http://schemas.microsoft.com/office/mac/drawingml/2011/main" val="1"/>
+              <ma14:placeholderFlag xmlns:ma14="http://schemas.microsoft.com/office/mac/drawingml/2011/main" xmlns="" val="1"/>
             </a:ext>
             <a:ext uri="{909E8E84-426E-40dd-AFC4-6F175D3DCCD1}">
-              <a14:hiddenFill xmlns="" xmlns:a14="http://schemas.microsoft.com/office/drawing/2010/main">
+              <a14:hiddenFill xmlns:a14="http://schemas.microsoft.com/office/drawing/2010/main" xmlns="">
                 <a:solidFill>
                   <a:srgbClr val="FFFFFF"/>
                 </a:solidFill>
@@ -3865,10 +3866,10 @@
           </a:ln>
           <a:extLst>
             <a:ext uri="{FAA26D3D-D897-4be2-8F04-BA451C77F1D7}">
-              <ma14:placeholderFlag xmlns="" xmlns:ma14="http://schemas.microsoft.com/office/mac/drawingml/2011/main" val="1"/>
+              <ma14:placeholderFlag xmlns:ma14="http://schemas.microsoft.com/office/mac/drawingml/2011/main" xmlns="" val="1"/>
             </a:ext>
             <a:ext uri="{909E8E84-426E-40dd-AFC4-6F175D3DCCD1}">
-              <a14:hiddenFill xmlns="" xmlns:a14="http://schemas.microsoft.com/office/drawing/2010/main">
+              <a14:hiddenFill xmlns:a14="http://schemas.microsoft.com/office/drawing/2010/main" xmlns="">
                 <a:solidFill>
                   <a:srgbClr val="FFFFFF"/>
                 </a:solidFill>
@@ -5723,6 +5724,595 @@
     <p:extLst>
       <p:ext uri="{BB962C8B-B14F-4D97-AF65-F5344CB8AC3E}">
         <p14:creationId xmlns:p14="http://schemas.microsoft.com/office/powerpoint/2010/main" val="2977792744"/>
+      </p:ext>
+    </p:extLst>
+  </p:cSld>
+  <p:clrMapOvr>
+    <a:masterClrMapping/>
+  </p:clrMapOvr>
+  <p:transition spd="med"/>
+</p:sld>
+</file>
+
+<file path=ppt/slides/slide2.xml><?xml version="1.0" encoding="utf-8"?>
+<p:sld xmlns:a="http://schemas.openxmlformats.org/drawingml/2006/main" xmlns:r="http://schemas.openxmlformats.org/officeDocument/2006/relationships" xmlns:p="http://schemas.openxmlformats.org/presentationml/2006/main">
+  <p:cSld>
+    <p:spTree>
+      <p:nvGrpSpPr>
+        <p:cNvPr id="1" name=""/>
+        <p:cNvGrpSpPr/>
+        <p:nvPr/>
+      </p:nvGrpSpPr>
+      <p:grpSpPr>
+        <a:xfrm>
+          <a:off x="0" y="0"/>
+          <a:ext cx="0" cy="0"/>
+          <a:chOff x="0" y="0"/>
+          <a:chExt cx="0" cy="0"/>
+        </a:xfrm>
+      </p:grpSpPr>
+      <p:sp>
+        <p:nvSpPr>
+          <p:cNvPr id="2" name="Title 1">
+            <a:extLst>
+              <a:ext uri="{FF2B5EF4-FFF2-40B4-BE49-F238E27FC236}">
+                <a16:creationId xmlns:a16="http://schemas.microsoft.com/office/drawing/2014/main" id="{93EA476A-5F79-784D-A85B-71BEB868C0AA}"/>
+              </a:ext>
+            </a:extLst>
+          </p:cNvPr>
+          <p:cNvSpPr>
+            <a:spLocks noGrp="1"/>
+          </p:cNvSpPr>
+          <p:nvPr>
+            <p:ph type="title"/>
+          </p:nvPr>
+        </p:nvSpPr>
+        <p:spPr/>
+        <p:txBody>
+          <a:bodyPr/>
+          <a:lstStyle/>
+          <a:p>
+            <a:r>
+              <a:rPr lang="en-US" dirty="0"/>
+              <a:t>Spark Components</a:t>
+            </a:r>
+          </a:p>
+        </p:txBody>
+      </p:sp>
+      <p:sp>
+        <p:nvSpPr>
+          <p:cNvPr id="4" name="Slide Number Placeholder 3">
+            <a:extLst>
+              <a:ext uri="{FF2B5EF4-FFF2-40B4-BE49-F238E27FC236}">
+                <a16:creationId xmlns:a16="http://schemas.microsoft.com/office/drawing/2014/main" id="{7DD0CC84-FF5F-B249-9FB7-CBA03D32B21B}"/>
+              </a:ext>
+            </a:extLst>
+          </p:cNvPr>
+          <p:cNvSpPr>
+            <a:spLocks noGrp="1"/>
+          </p:cNvSpPr>
+          <p:nvPr>
+            <p:ph type="sldNum" sz="quarter" idx="2"/>
+          </p:nvPr>
+        </p:nvSpPr>
+        <p:spPr/>
+        <p:txBody>
+          <a:bodyPr/>
+          <a:lstStyle/>
+          <a:p>
+            <a:fld id="{86CB4B4D-7CA3-9044-876B-883B54F8677D}" type="slidenum">
+              <a:rPr lang="en-US" smtClean="0"/>
+              <a:pPr/>
+              <a:t>2</a:t>
+            </a:fld>
+            <a:endParaRPr lang="en-US"/>
+          </a:p>
+        </p:txBody>
+      </p:sp>
+      <p:sp>
+        <p:nvSpPr>
+          <p:cNvPr id="8" name="Rectangle 7">
+            <a:extLst>
+              <a:ext uri="{FF2B5EF4-FFF2-40B4-BE49-F238E27FC236}">
+                <a16:creationId xmlns:a16="http://schemas.microsoft.com/office/drawing/2014/main" id="{AFF5B7AA-A332-FF41-A3D7-778E83375353}"/>
+              </a:ext>
+            </a:extLst>
+          </p:cNvPr>
+          <p:cNvSpPr/>
+          <p:nvPr/>
+        </p:nvSpPr>
+        <p:spPr>
+          <a:xfrm>
+            <a:off x="589412" y="3034904"/>
+            <a:ext cx="7162088" cy="660400"/>
+          </a:xfrm>
+          <a:prstGeom prst="rect">
+            <a:avLst/>
+          </a:prstGeom>
+          <a:solidFill>
+            <a:srgbClr val="E89724"/>
+          </a:solidFill>
+          <a:ln>
+            <a:noFill/>
+          </a:ln>
+          <a:effectLst>
+            <a:outerShdw blurRad="50800" dist="38100" dir="5400000" algn="t" rotWithShape="0">
+              <a:prstClr val="black">
+                <a:alpha val="40000"/>
+              </a:prstClr>
+            </a:outerShdw>
+          </a:effectLst>
+        </p:spPr>
+        <p:style>
+          <a:lnRef idx="2">
+            <a:schemeClr val="accent1">
+              <a:shade val="50000"/>
+            </a:schemeClr>
+          </a:lnRef>
+          <a:fillRef idx="1">
+            <a:schemeClr val="accent1"/>
+          </a:fillRef>
+          <a:effectRef idx="0">
+            <a:schemeClr val="accent1"/>
+          </a:effectRef>
+          <a:fontRef idx="minor">
+            <a:schemeClr val="lt1"/>
+          </a:fontRef>
+        </p:style>
+        <p:txBody>
+          <a:bodyPr rtlCol="0" anchor="t"/>
+          <a:lstStyle/>
+          <a:p>
+            <a:pPr marL="0" marR="0" indent="0" algn="ctr" defTabSz="685800" rtl="0" eaLnBrk="1" fontAlgn="auto" latinLnBrk="0" hangingPunct="1">
+              <a:lnSpc>
+                <a:spcPct val="100000"/>
+              </a:lnSpc>
+              <a:spcBef>
+                <a:spcPts val="0"/>
+              </a:spcBef>
+              <a:spcAft>
+                <a:spcPts val="0"/>
+              </a:spcAft>
+              <a:buClrTx/>
+              <a:buSzTx/>
+              <a:buFontTx/>
+              <a:buNone/>
+              <a:tabLst/>
+            </a:pPr>
+            <a:r>
+              <a:rPr lang="en-US" sz="1200" b="1" dirty="0">
+                <a:solidFill>
+                  <a:schemeClr val="bg1"/>
+                </a:solidFill>
+                <a:latin typeface="Arial"/>
+              </a:rPr>
+              <a:t>Spark Core</a:t>
+            </a:r>
+            <a:endParaRPr kumimoji="0" lang="en-US" sz="1200" b="1" i="0" u="none" strike="noStrike" kern="1200" cap="none" spc="0" normalizeH="0" baseline="0" noProof="0" dirty="0">
+              <a:ln>
+                <a:noFill/>
+              </a:ln>
+              <a:solidFill>
+                <a:schemeClr val="bg1"/>
+              </a:solidFill>
+              <a:effectLst/>
+              <a:uLnTx/>
+              <a:uFillTx/>
+              <a:latin typeface="Arial"/>
+            </a:endParaRPr>
+          </a:p>
+        </p:txBody>
+      </p:sp>
+      <p:sp>
+        <p:nvSpPr>
+          <p:cNvPr id="9" name="Rectangle 8">
+            <a:extLst>
+              <a:ext uri="{FF2B5EF4-FFF2-40B4-BE49-F238E27FC236}">
+                <a16:creationId xmlns:a16="http://schemas.microsoft.com/office/drawing/2014/main" id="{30AC6E0B-4B8D-0C44-9FB7-9EBB6CC383ED}"/>
+              </a:ext>
+            </a:extLst>
+          </p:cNvPr>
+          <p:cNvSpPr/>
+          <p:nvPr/>
+        </p:nvSpPr>
+        <p:spPr>
+          <a:xfrm>
+            <a:off x="1402839" y="1911351"/>
+            <a:ext cx="1105549" cy="660399"/>
+          </a:xfrm>
+          <a:prstGeom prst="rect">
+            <a:avLst/>
+          </a:prstGeom>
+          <a:solidFill>
+            <a:srgbClr val="E89724"/>
+          </a:solidFill>
+          <a:ln>
+            <a:noFill/>
+          </a:ln>
+          <a:effectLst>
+            <a:outerShdw blurRad="50800" dist="38100" dir="5400000" algn="t" rotWithShape="0">
+              <a:prstClr val="black">
+                <a:alpha val="40000"/>
+              </a:prstClr>
+            </a:outerShdw>
+          </a:effectLst>
+        </p:spPr>
+        <p:style>
+          <a:lnRef idx="2">
+            <a:schemeClr val="accent1">
+              <a:shade val="50000"/>
+            </a:schemeClr>
+          </a:lnRef>
+          <a:fillRef idx="1">
+            <a:schemeClr val="accent1"/>
+          </a:fillRef>
+          <a:effectRef idx="0">
+            <a:schemeClr val="accent1"/>
+          </a:effectRef>
+          <a:fontRef idx="minor">
+            <a:schemeClr val="lt1"/>
+          </a:fontRef>
+        </p:style>
+        <p:txBody>
+          <a:bodyPr rtlCol="0" anchor="ctr"/>
+          <a:lstStyle/>
+          <a:p>
+            <a:pPr marL="0" marR="0" indent="0" algn="ctr" defTabSz="685800" rtl="0" eaLnBrk="1" fontAlgn="auto" latinLnBrk="0" hangingPunct="1">
+              <a:lnSpc>
+                <a:spcPct val="100000"/>
+              </a:lnSpc>
+              <a:spcBef>
+                <a:spcPts val="0"/>
+              </a:spcBef>
+              <a:spcAft>
+                <a:spcPts val="0"/>
+              </a:spcAft>
+              <a:buClrTx/>
+              <a:buSzTx/>
+              <a:buFontTx/>
+              <a:buNone/>
+              <a:tabLst/>
+            </a:pPr>
+            <a:r>
+              <a:rPr lang="en-US" sz="1200" b="1" dirty="0">
+                <a:solidFill>
+                  <a:schemeClr val="bg1"/>
+                </a:solidFill>
+                <a:latin typeface="Arial"/>
+              </a:rPr>
+              <a:t>Spark Streaming</a:t>
+            </a:r>
+            <a:endParaRPr kumimoji="0" lang="en-US" sz="1200" b="1" i="0" u="none" strike="noStrike" kern="1200" cap="none" spc="0" normalizeH="0" baseline="0" noProof="0" dirty="0">
+              <a:ln>
+                <a:noFill/>
+              </a:ln>
+              <a:solidFill>
+                <a:schemeClr val="bg1"/>
+              </a:solidFill>
+              <a:effectLst/>
+              <a:uLnTx/>
+              <a:uFillTx/>
+              <a:latin typeface="Arial"/>
+            </a:endParaRPr>
+          </a:p>
+        </p:txBody>
+      </p:sp>
+      <p:pic>
+        <p:nvPicPr>
+          <p:cNvPr id="3" name="Picture 2">
+            <a:extLst>
+              <a:ext uri="{FF2B5EF4-FFF2-40B4-BE49-F238E27FC236}">
+                <a16:creationId xmlns:a16="http://schemas.microsoft.com/office/drawing/2014/main" id="{E28ABCCB-F8A7-2A44-B9B8-912118B96DCF}"/>
+              </a:ext>
+            </a:extLst>
+          </p:cNvPr>
+          <p:cNvPicPr>
+            <a:picLocks noChangeAspect="1"/>
+          </p:cNvPicPr>
+          <p:nvPr/>
+        </p:nvPicPr>
+        <p:blipFill>
+          <a:blip r:embed="rId2"/>
+          <a:stretch>
+            <a:fillRect/>
+          </a:stretch>
+        </p:blipFill>
+        <p:spPr>
+          <a:xfrm>
+            <a:off x="677524" y="3096568"/>
+            <a:ext cx="1429951" cy="562604"/>
+          </a:xfrm>
+          <a:prstGeom prst="rect">
+            <a:avLst/>
+          </a:prstGeom>
+        </p:spPr>
+      </p:pic>
+      <p:sp>
+        <p:nvSpPr>
+          <p:cNvPr id="19" name="Rectangle 18">
+            <a:extLst>
+              <a:ext uri="{FF2B5EF4-FFF2-40B4-BE49-F238E27FC236}">
+                <a16:creationId xmlns:a16="http://schemas.microsoft.com/office/drawing/2014/main" id="{4FDE1C11-860C-E442-A42F-846258E3AE41}"/>
+              </a:ext>
+            </a:extLst>
+          </p:cNvPr>
+          <p:cNvSpPr/>
+          <p:nvPr/>
+        </p:nvSpPr>
+        <p:spPr>
+          <a:xfrm>
+            <a:off x="3064907" y="1911351"/>
+            <a:ext cx="1105549" cy="660399"/>
+          </a:xfrm>
+          <a:prstGeom prst="rect">
+            <a:avLst/>
+          </a:prstGeom>
+          <a:solidFill>
+            <a:srgbClr val="E89724"/>
+          </a:solidFill>
+          <a:ln>
+            <a:noFill/>
+          </a:ln>
+          <a:effectLst>
+            <a:outerShdw blurRad="50800" dist="38100" dir="5400000" algn="t" rotWithShape="0">
+              <a:prstClr val="black">
+                <a:alpha val="40000"/>
+              </a:prstClr>
+            </a:outerShdw>
+          </a:effectLst>
+        </p:spPr>
+        <p:style>
+          <a:lnRef idx="2">
+            <a:schemeClr val="accent1">
+              <a:shade val="50000"/>
+            </a:schemeClr>
+          </a:lnRef>
+          <a:fillRef idx="1">
+            <a:schemeClr val="accent1"/>
+          </a:fillRef>
+          <a:effectRef idx="0">
+            <a:schemeClr val="accent1"/>
+          </a:effectRef>
+          <a:fontRef idx="minor">
+            <a:schemeClr val="lt1"/>
+          </a:fontRef>
+        </p:style>
+        <p:txBody>
+          <a:bodyPr rtlCol="0" anchor="ctr"/>
+          <a:lstStyle/>
+          <a:p>
+            <a:pPr marL="0" marR="0" indent="0" algn="ctr" defTabSz="685800" rtl="0" eaLnBrk="1" fontAlgn="auto" latinLnBrk="0" hangingPunct="1">
+              <a:lnSpc>
+                <a:spcPct val="100000"/>
+              </a:lnSpc>
+              <a:spcBef>
+                <a:spcPts val="0"/>
+              </a:spcBef>
+              <a:spcAft>
+                <a:spcPts val="0"/>
+              </a:spcAft>
+              <a:buClrTx/>
+              <a:buSzTx/>
+              <a:buFontTx/>
+              <a:buNone/>
+              <a:tabLst/>
+            </a:pPr>
+            <a:r>
+              <a:rPr lang="en-US" sz="1200" b="1" dirty="0">
+                <a:solidFill>
+                  <a:schemeClr val="bg1"/>
+                </a:solidFill>
+                <a:latin typeface="Arial"/>
+              </a:rPr>
+              <a:t>Spark SQL</a:t>
+            </a:r>
+            <a:endParaRPr kumimoji="0" lang="en-US" sz="1200" b="1" i="0" u="none" strike="noStrike" kern="1200" cap="none" spc="0" normalizeH="0" baseline="0" noProof="0" dirty="0">
+              <a:ln>
+                <a:noFill/>
+              </a:ln>
+              <a:solidFill>
+                <a:schemeClr val="bg1"/>
+              </a:solidFill>
+              <a:effectLst/>
+              <a:uLnTx/>
+              <a:uFillTx/>
+              <a:latin typeface="Arial"/>
+            </a:endParaRPr>
+          </a:p>
+        </p:txBody>
+      </p:sp>
+      <p:sp>
+        <p:nvSpPr>
+          <p:cNvPr id="22" name="Rectangle 21">
+            <a:extLst>
+              <a:ext uri="{FF2B5EF4-FFF2-40B4-BE49-F238E27FC236}">
+                <a16:creationId xmlns:a16="http://schemas.microsoft.com/office/drawing/2014/main" id="{887CEF32-5CD6-6848-ABD3-389E19A7836D}"/>
+              </a:ext>
+            </a:extLst>
+          </p:cNvPr>
+          <p:cNvSpPr/>
+          <p:nvPr/>
+        </p:nvSpPr>
+        <p:spPr>
+          <a:xfrm>
+            <a:off x="4659642" y="1911350"/>
+            <a:ext cx="1105549" cy="660399"/>
+          </a:xfrm>
+          <a:prstGeom prst="rect">
+            <a:avLst/>
+          </a:prstGeom>
+          <a:solidFill>
+            <a:srgbClr val="E89724"/>
+          </a:solidFill>
+          <a:ln>
+            <a:noFill/>
+          </a:ln>
+          <a:effectLst>
+            <a:outerShdw blurRad="50800" dist="38100" dir="5400000" algn="t" rotWithShape="0">
+              <a:prstClr val="black">
+                <a:alpha val="40000"/>
+              </a:prstClr>
+            </a:outerShdw>
+          </a:effectLst>
+        </p:spPr>
+        <p:style>
+          <a:lnRef idx="2">
+            <a:schemeClr val="accent1">
+              <a:shade val="50000"/>
+            </a:schemeClr>
+          </a:lnRef>
+          <a:fillRef idx="1">
+            <a:schemeClr val="accent1"/>
+          </a:fillRef>
+          <a:effectRef idx="0">
+            <a:schemeClr val="accent1"/>
+          </a:effectRef>
+          <a:fontRef idx="minor">
+            <a:schemeClr val="lt1"/>
+          </a:fontRef>
+        </p:style>
+        <p:txBody>
+          <a:bodyPr rtlCol="0" anchor="ctr"/>
+          <a:lstStyle/>
+          <a:p>
+            <a:pPr marL="0" marR="0" indent="0" algn="ctr" defTabSz="685800" rtl="0" eaLnBrk="1" fontAlgn="auto" latinLnBrk="0" hangingPunct="1">
+              <a:lnSpc>
+                <a:spcPct val="100000"/>
+              </a:lnSpc>
+              <a:spcBef>
+                <a:spcPts val="0"/>
+              </a:spcBef>
+              <a:spcAft>
+                <a:spcPts val="0"/>
+              </a:spcAft>
+              <a:buClrTx/>
+              <a:buSzTx/>
+              <a:buFontTx/>
+              <a:buNone/>
+              <a:tabLst/>
+            </a:pPr>
+            <a:r>
+              <a:rPr lang="en-US" sz="1200" b="1" dirty="0" err="1">
+                <a:solidFill>
+                  <a:schemeClr val="bg1"/>
+                </a:solidFill>
+                <a:latin typeface="Arial"/>
+              </a:rPr>
+              <a:t>MLLib</a:t>
+            </a:r>
+            <a:endParaRPr kumimoji="0" lang="en-US" sz="1200" b="1" i="0" u="none" strike="noStrike" kern="1200" cap="none" spc="0" normalizeH="0" baseline="0" noProof="0" dirty="0">
+              <a:ln>
+                <a:noFill/>
+              </a:ln>
+              <a:solidFill>
+                <a:schemeClr val="bg1"/>
+              </a:solidFill>
+              <a:effectLst/>
+              <a:uLnTx/>
+              <a:uFillTx/>
+              <a:latin typeface="Arial"/>
+            </a:endParaRPr>
+          </a:p>
+        </p:txBody>
+      </p:sp>
+      <p:sp>
+        <p:nvSpPr>
+          <p:cNvPr id="24" name="Rectangle 23">
+            <a:extLst>
+              <a:ext uri="{FF2B5EF4-FFF2-40B4-BE49-F238E27FC236}">
+                <a16:creationId xmlns:a16="http://schemas.microsoft.com/office/drawing/2014/main" id="{F633282B-817B-2D40-B6D4-93FCA3AA9AF8}"/>
+              </a:ext>
+            </a:extLst>
+          </p:cNvPr>
+          <p:cNvSpPr/>
+          <p:nvPr/>
+        </p:nvSpPr>
+        <p:spPr>
+          <a:xfrm>
+            <a:off x="6254377" y="1956970"/>
+            <a:ext cx="1105549" cy="660399"/>
+          </a:xfrm>
+          <a:prstGeom prst="rect">
+            <a:avLst/>
+          </a:prstGeom>
+          <a:solidFill>
+            <a:srgbClr val="E89724"/>
+          </a:solidFill>
+          <a:ln>
+            <a:noFill/>
+          </a:ln>
+          <a:effectLst>
+            <a:outerShdw blurRad="50800" dist="38100" dir="5400000" algn="t" rotWithShape="0">
+              <a:prstClr val="black">
+                <a:alpha val="40000"/>
+              </a:prstClr>
+            </a:outerShdw>
+          </a:effectLst>
+        </p:spPr>
+        <p:style>
+          <a:lnRef idx="2">
+            <a:schemeClr val="accent1">
+              <a:shade val="50000"/>
+            </a:schemeClr>
+          </a:lnRef>
+          <a:fillRef idx="1">
+            <a:schemeClr val="accent1"/>
+          </a:fillRef>
+          <a:effectRef idx="0">
+            <a:schemeClr val="accent1"/>
+          </a:effectRef>
+          <a:fontRef idx="minor">
+            <a:schemeClr val="lt1"/>
+          </a:fontRef>
+        </p:style>
+        <p:txBody>
+          <a:bodyPr rtlCol="0" anchor="ctr"/>
+          <a:lstStyle/>
+          <a:p>
+            <a:pPr marL="0" marR="0" indent="0" algn="ctr" defTabSz="685800" rtl="0" eaLnBrk="1" fontAlgn="auto" latinLnBrk="0" hangingPunct="1">
+              <a:lnSpc>
+                <a:spcPct val="100000"/>
+              </a:lnSpc>
+              <a:spcBef>
+                <a:spcPts val="0"/>
+              </a:spcBef>
+              <a:spcAft>
+                <a:spcPts val="0"/>
+              </a:spcAft>
+              <a:buClrTx/>
+              <a:buSzTx/>
+              <a:buFontTx/>
+              <a:buNone/>
+              <a:tabLst/>
+            </a:pPr>
+            <a:r>
+              <a:rPr lang="en-US" sz="1200" b="1" dirty="0" err="1">
+                <a:solidFill>
+                  <a:schemeClr val="bg1"/>
+                </a:solidFill>
+                <a:latin typeface="Arial"/>
+              </a:rPr>
+              <a:t>GraphX</a:t>
+            </a:r>
+            <a:endParaRPr kumimoji="0" lang="en-US" sz="1200" b="1" i="0" u="none" strike="noStrike" kern="1200" cap="none" spc="0" normalizeH="0" baseline="0" noProof="0" dirty="0">
+              <a:ln>
+                <a:noFill/>
+              </a:ln>
+              <a:solidFill>
+                <a:schemeClr val="bg1"/>
+              </a:solidFill>
+              <a:effectLst/>
+              <a:uLnTx/>
+              <a:uFillTx/>
+              <a:latin typeface="Arial"/>
+            </a:endParaRPr>
+          </a:p>
+        </p:txBody>
+      </p:sp>
+    </p:spTree>
+    <p:extLst>
+      <p:ext uri="{BB962C8B-B14F-4D97-AF65-F5344CB8AC3E}">
+        <p14:creationId xmlns:p14="http://schemas.microsoft.com/office/powerpoint/2010/main" val="2283980274"/>
       </p:ext>
     </p:extLst>
   </p:cSld>

</xml_diff>

<commit_message>
work on spark streaming
</commit_message>
<xml_diff>
--- a/docs/spark-diagrams.pptx
+++ b/docs/spark-diagrams.pptx
@@ -6,15 +6,16 @@
     <p:sldMasterId id="2147483943" r:id="rId2"/>
   </p:sldMasterIdLst>
   <p:notesMasterIdLst>
-    <p:notesMasterId r:id="rId6"/>
+    <p:notesMasterId r:id="rId7"/>
   </p:notesMasterIdLst>
   <p:handoutMasterIdLst>
-    <p:handoutMasterId r:id="rId7"/>
+    <p:handoutMasterId r:id="rId8"/>
   </p:handoutMasterIdLst>
   <p:sldIdLst>
     <p:sldId id="141168470" r:id="rId3"/>
     <p:sldId id="141168471" r:id="rId4"/>
     <p:sldId id="141168472" r:id="rId5"/>
+    <p:sldId id="141168473" r:id="rId6"/>
   </p:sldIdLst>
   <p:sldSz cx="9144000" cy="5143500" type="screen16x9"/>
   <p:notesSz cx="6858000" cy="9144000"/>
@@ -217,7 +218,7 @@
           <a:p>
             <a:fld id="{43B1B1F9-D0CB-FF4D-BEE0-BED1F1FDA196}" type="datetimeFigureOut">
               <a:rPr lang="en-US" smtClean="0"/>
-              <a:t>1/8/20</a:t>
+              <a:t>1/10/20</a:t>
             </a:fld>
             <a:endParaRPr lang="en-US"/>
           </a:p>
@@ -382,7 +383,7 @@
           <a:p>
             <a:fld id="{26BE012A-D992-5D42-B86E-AA2BC0764EE1}" type="datetimeFigureOut">
               <a:rPr lang="en-US" smtClean="0"/>
-              <a:t>1/8/20</a:t>
+              <a:t>1/10/20</a:t>
             </a:fld>
             <a:endParaRPr lang="en-US"/>
           </a:p>
@@ -2967,14 +2968,14 @@
           </a:ln>
           <a:extLst>
             <a:ext uri="{909E8E84-426E-40dd-AFC4-6F175D3DCCD1}">
-              <a14:hiddenFill xmlns:a14="http://schemas.microsoft.com/office/drawing/2010/main" xmlns="">
+              <a14:hiddenFill xmlns="" xmlns:a14="http://schemas.microsoft.com/office/drawing/2010/main">
                 <a:solidFill>
                   <a:srgbClr val="FFFFFF"/>
                 </a:solidFill>
               </a14:hiddenFill>
             </a:ext>
             <a:ext uri="{91240B29-F687-4f45-9708-019B960494DF}">
-              <a14:hiddenLine xmlns:a14="http://schemas.microsoft.com/office/drawing/2010/main" xmlns="" w="9525">
+              <a14:hiddenLine xmlns="" xmlns:a14="http://schemas.microsoft.com/office/drawing/2010/main" w="9525">
                 <a:solidFill>
                   <a:srgbClr val="000000"/>
                 </a:solidFill>
@@ -3026,14 +3027,14 @@
           <a:effectLst/>
           <a:extLst>
             <a:ext uri="{909E8E84-426E-40dd-AFC4-6F175D3DCCD1}">
-              <a14:hiddenFill xmlns:a14="http://schemas.microsoft.com/office/drawing/2010/main" xmlns="">
+              <a14:hiddenFill xmlns="" xmlns:a14="http://schemas.microsoft.com/office/drawing/2010/main">
                 <a:solidFill>
                   <a:schemeClr val="accent1"/>
                 </a:solidFill>
               </a14:hiddenFill>
             </a:ext>
             <a:ext uri="{91240B29-F687-4f45-9708-019B960494DF}">
-              <a14:hiddenLine xmlns:a14="http://schemas.microsoft.com/office/drawing/2010/main" xmlns="" w="9525">
+              <a14:hiddenLine xmlns="" xmlns:a14="http://schemas.microsoft.com/office/drawing/2010/main" w="9525">
                 <a:solidFill>
                   <a:schemeClr val="tx1"/>
                 </a:solidFill>
@@ -3043,7 +3044,7 @@
               </a14:hiddenLine>
             </a:ext>
             <a:ext uri="{AF507438-7753-43e0-B8FC-AC1667EBCBE1}">
-              <a14:hiddenEffects xmlns:a14="http://schemas.microsoft.com/office/drawing/2010/main" xmlns="">
+              <a14:hiddenEffects xmlns="" xmlns:a14="http://schemas.microsoft.com/office/drawing/2010/main">
                 <a:effectLst>
                   <a:outerShdw blurRad="63500" dist="38099" dir="2700000" algn="ctr" rotWithShape="0">
                     <a:schemeClr val="bg2">
@@ -3813,10 +3814,10 @@
           </a:ln>
           <a:extLst>
             <a:ext uri="{FAA26D3D-D897-4be2-8F04-BA451C77F1D7}">
-              <ma14:placeholderFlag xmlns="" xmlns:ma14="http://schemas.microsoft.com/office/mac/drawingml/2011/main" val="1"/>
+              <ma14:placeholderFlag xmlns:ma14="http://schemas.microsoft.com/office/mac/drawingml/2011/main" xmlns="" val="1"/>
             </a:ext>
             <a:ext uri="{909E8E84-426E-40dd-AFC4-6F175D3DCCD1}">
-              <a14:hiddenFill xmlns="" xmlns:a14="http://schemas.microsoft.com/office/drawing/2010/main">
+              <a14:hiddenFill xmlns:a14="http://schemas.microsoft.com/office/drawing/2010/main" xmlns="">
                 <a:solidFill>
                   <a:srgbClr val="FFFFFF"/>
                 </a:solidFill>
@@ -3867,10 +3868,10 @@
           </a:ln>
           <a:extLst>
             <a:ext uri="{FAA26D3D-D897-4be2-8F04-BA451C77F1D7}">
-              <ma14:placeholderFlag xmlns="" xmlns:ma14="http://schemas.microsoft.com/office/mac/drawingml/2011/main" val="1"/>
+              <ma14:placeholderFlag xmlns:ma14="http://schemas.microsoft.com/office/mac/drawingml/2011/main" xmlns="" val="1"/>
             </a:ext>
             <a:ext uri="{909E8E84-426E-40dd-AFC4-6F175D3DCCD1}">
-              <a14:hiddenFill xmlns="" xmlns:a14="http://schemas.microsoft.com/office/drawing/2010/main">
+              <a14:hiddenFill xmlns:a14="http://schemas.microsoft.com/office/drawing/2010/main" xmlns="">
                 <a:solidFill>
                   <a:srgbClr val="FFFFFF"/>
                 </a:solidFill>
@@ -6419,6 +6420,16 @@
           <a:prstGeom prst="homePlate">
             <a:avLst/>
           </a:prstGeom>
+          <a:ln>
+            <a:noFill/>
+          </a:ln>
+          <a:effectLst>
+            <a:outerShdw blurRad="50800" dist="38100" dir="5400000" algn="t" rotWithShape="0">
+              <a:prstClr val="black">
+                <a:alpha val="40000"/>
+              </a:prstClr>
+            </a:outerShdw>
+          </a:effectLst>
         </p:spPr>
         <p:style>
           <a:lnRef idx="2">
@@ -6528,6 +6539,16 @@
           <a:prstGeom prst="homePlate">
             <a:avLst/>
           </a:prstGeom>
+          <a:ln>
+            <a:noFill/>
+          </a:ln>
+          <a:effectLst>
+            <a:outerShdw blurRad="50800" dist="38100" dir="5400000" algn="t" rotWithShape="0">
+              <a:prstClr val="black">
+                <a:alpha val="40000"/>
+              </a:prstClr>
+            </a:outerShdw>
+          </a:effectLst>
         </p:spPr>
         <p:style>
           <a:lnRef idx="2">
@@ -6602,6 +6623,16 @@
           <a:prstGeom prst="homePlate">
             <a:avLst/>
           </a:prstGeom>
+          <a:ln>
+            <a:noFill/>
+          </a:ln>
+          <a:effectLst>
+            <a:outerShdw blurRad="50800" dist="38100" dir="5400000" algn="t" rotWithShape="0">
+              <a:prstClr val="black">
+                <a:alpha val="40000"/>
+              </a:prstClr>
+            </a:outerShdw>
+          </a:effectLst>
         </p:spPr>
         <p:style>
           <a:lnRef idx="2">
@@ -6676,6 +6707,16 @@
           <a:prstGeom prst="rect">
             <a:avLst/>
           </a:prstGeom>
+          <a:ln>
+            <a:noFill/>
+          </a:ln>
+          <a:effectLst>
+            <a:outerShdw blurRad="50800" dist="38100" dir="5400000" algn="t" rotWithShape="0">
+              <a:prstClr val="black">
+                <a:alpha val="40000"/>
+              </a:prstClr>
+            </a:outerShdw>
+          </a:effectLst>
         </p:spPr>
         <p:style>
           <a:lnRef idx="2">
@@ -6747,12 +6788,22 @@
         </p:nvSpPr>
         <p:spPr>
           <a:xfrm>
-            <a:off x="2877015" y="1518351"/>
+            <a:off x="2723173" y="2234156"/>
             <a:ext cx="914400" cy="456199"/>
           </a:xfrm>
           <a:prstGeom prst="rect">
             <a:avLst/>
           </a:prstGeom>
+          <a:ln>
+            <a:noFill/>
+          </a:ln>
+          <a:effectLst>
+            <a:outerShdw blurRad="50800" dist="38100" dir="5400000" algn="t" rotWithShape="0">
+              <a:prstClr val="black">
+                <a:alpha val="40000"/>
+              </a:prstClr>
+            </a:outerShdw>
+          </a:effectLst>
         </p:spPr>
         <p:style>
           <a:lnRef idx="2">
@@ -6824,12 +6875,22 @@
         </p:nvSpPr>
         <p:spPr>
           <a:xfrm>
-            <a:off x="2877015" y="2115551"/>
+            <a:off x="3754233" y="2228339"/>
             <a:ext cx="914400" cy="456199"/>
           </a:xfrm>
           <a:prstGeom prst="rect">
             <a:avLst/>
           </a:prstGeom>
+          <a:ln>
+            <a:noFill/>
+          </a:ln>
+          <a:effectLst>
+            <a:outerShdw blurRad="50800" dist="38100" dir="5400000" algn="t" rotWithShape="0">
+              <a:prstClr val="black">
+                <a:alpha val="40000"/>
+              </a:prstClr>
+            </a:outerShdw>
+          </a:effectLst>
         </p:spPr>
         <p:style>
           <a:lnRef idx="2">
@@ -6901,12 +6962,22 @@
         </p:nvSpPr>
         <p:spPr>
           <a:xfrm>
-            <a:off x="2877015" y="2788050"/>
+            <a:off x="4833030" y="2228339"/>
             <a:ext cx="914400" cy="456199"/>
           </a:xfrm>
           <a:prstGeom prst="rect">
             <a:avLst/>
           </a:prstGeom>
+          <a:ln>
+            <a:noFill/>
+          </a:ln>
+          <a:effectLst>
+            <a:outerShdw blurRad="50800" dist="38100" dir="5400000" algn="t" rotWithShape="0">
+              <a:prstClr val="black">
+                <a:alpha val="40000"/>
+              </a:prstClr>
+            </a:outerShdw>
+          </a:effectLst>
         </p:spPr>
         <p:style>
           <a:lnRef idx="2">
@@ -7019,12 +7090,22 @@
         </p:nvSpPr>
         <p:spPr>
           <a:xfrm>
-            <a:off x="5553346" y="1579291"/>
+            <a:off x="6906300" y="1544896"/>
             <a:ext cx="978408" cy="300082"/>
           </a:xfrm>
           <a:prstGeom prst="homePlate">
             <a:avLst/>
           </a:prstGeom>
+          <a:ln>
+            <a:noFill/>
+          </a:ln>
+          <a:effectLst>
+            <a:outerShdw blurRad="50800" dist="38100" dir="5400000" algn="t" rotWithShape="0">
+              <a:prstClr val="black">
+                <a:alpha val="40000"/>
+              </a:prstClr>
+            </a:outerShdw>
+          </a:effectLst>
         </p:spPr>
         <p:style>
           <a:lnRef idx="2">
@@ -7093,12 +7174,22 @@
         </p:nvSpPr>
         <p:spPr>
           <a:xfrm>
-            <a:off x="5553346" y="2121519"/>
+            <a:off x="6906300" y="2087124"/>
             <a:ext cx="978408" cy="312682"/>
           </a:xfrm>
           <a:prstGeom prst="homePlate">
             <a:avLst/>
           </a:prstGeom>
+          <a:ln>
+            <a:noFill/>
+          </a:ln>
+          <a:effectLst>
+            <a:outerShdw blurRad="50800" dist="38100" dir="5400000" algn="t" rotWithShape="0">
+              <a:prstClr val="black">
+                <a:alpha val="40000"/>
+              </a:prstClr>
+            </a:outerShdw>
+          </a:effectLst>
         </p:spPr>
         <p:style>
           <a:lnRef idx="2">
@@ -7167,12 +7258,22 @@
         </p:nvSpPr>
         <p:spPr>
           <a:xfrm>
-            <a:off x="5553346" y="2709299"/>
+            <a:off x="6906300" y="2674904"/>
             <a:ext cx="978408" cy="312682"/>
           </a:xfrm>
           <a:prstGeom prst="homePlate">
             <a:avLst/>
           </a:prstGeom>
+          <a:ln>
+            <a:noFill/>
+          </a:ln>
+          <a:effectLst>
+            <a:outerShdw blurRad="50800" dist="38100" dir="5400000" algn="t" rotWithShape="0">
+              <a:prstClr val="black">
+                <a:alpha val="40000"/>
+              </a:prstClr>
+            </a:outerShdw>
+          </a:effectLst>
         </p:spPr>
         <p:style>
           <a:lnRef idx="2">
@@ -7241,7 +7342,7 @@
         </p:nvSpPr>
         <p:spPr>
           <a:xfrm>
-            <a:off x="5553346" y="1088578"/>
+            <a:off x="6906300" y="1054183"/>
             <a:ext cx="2031325" cy="507831"/>
           </a:xfrm>
           <a:prstGeom prst="rect">
@@ -7268,10 +7369,2088 @@
           </a:p>
         </p:txBody>
       </p:sp>
+      <p:sp>
+        <p:nvSpPr>
+          <p:cNvPr id="21" name="Rectangle 20">
+            <a:extLst>
+              <a:ext uri="{FF2B5EF4-FFF2-40B4-BE49-F238E27FC236}">
+                <a16:creationId xmlns:a16="http://schemas.microsoft.com/office/drawing/2014/main" id="{A278C6CF-E0A4-F041-BF15-9576B136E0CA}"/>
+              </a:ext>
+            </a:extLst>
+          </p:cNvPr>
+          <p:cNvSpPr/>
+          <p:nvPr/>
+        </p:nvSpPr>
+        <p:spPr>
+          <a:xfrm>
+            <a:off x="5853383" y="1325994"/>
+            <a:ext cx="914400" cy="1695987"/>
+          </a:xfrm>
+          <a:prstGeom prst="rect">
+            <a:avLst/>
+          </a:prstGeom>
+          <a:solidFill>
+            <a:srgbClr val="E89724"/>
+          </a:solidFill>
+          <a:ln>
+            <a:noFill/>
+          </a:ln>
+          <a:effectLst>
+            <a:outerShdw blurRad="50800" dist="38100" dir="5400000" algn="t" rotWithShape="0">
+              <a:prstClr val="black">
+                <a:alpha val="40000"/>
+              </a:prstClr>
+            </a:outerShdw>
+          </a:effectLst>
+        </p:spPr>
+        <p:style>
+          <a:lnRef idx="2">
+            <a:schemeClr val="accent1">
+              <a:shade val="50000"/>
+            </a:schemeClr>
+          </a:lnRef>
+          <a:fillRef idx="1">
+            <a:schemeClr val="accent1"/>
+          </a:fillRef>
+          <a:effectRef idx="0">
+            <a:schemeClr val="accent1"/>
+          </a:effectRef>
+          <a:fontRef idx="minor">
+            <a:schemeClr val="lt1"/>
+          </a:fontRef>
+        </p:style>
+        <p:txBody>
+          <a:bodyPr rtlCol="0" anchor="t"/>
+          <a:lstStyle/>
+          <a:p>
+            <a:pPr marL="0" marR="0" indent="0" algn="ctr" defTabSz="685800" rtl="0" eaLnBrk="1" fontAlgn="auto" latinLnBrk="0" hangingPunct="1">
+              <a:lnSpc>
+                <a:spcPct val="100000"/>
+              </a:lnSpc>
+              <a:spcBef>
+                <a:spcPts val="0"/>
+              </a:spcBef>
+              <a:spcAft>
+                <a:spcPts val="0"/>
+              </a:spcAft>
+              <a:buClrTx/>
+              <a:buSzTx/>
+              <a:buFontTx/>
+              <a:buNone/>
+              <a:tabLst/>
+            </a:pPr>
+            <a:r>
+              <a:rPr lang="en-US" sz="1200" b="1" dirty="0">
+                <a:solidFill>
+                  <a:schemeClr val="bg1"/>
+                </a:solidFill>
+                <a:latin typeface="Arial"/>
+              </a:rPr>
+              <a:t>Spark Core</a:t>
+            </a:r>
+            <a:endParaRPr kumimoji="0" lang="en-US" sz="1200" b="1" i="0" u="none" strike="noStrike" kern="1200" cap="none" spc="0" normalizeH="0" baseline="0" noProof="0" dirty="0">
+              <a:ln>
+                <a:noFill/>
+              </a:ln>
+              <a:solidFill>
+                <a:schemeClr val="bg1"/>
+              </a:solidFill>
+              <a:effectLst/>
+              <a:uLnTx/>
+              <a:uFillTx/>
+              <a:latin typeface="Arial"/>
+            </a:endParaRPr>
+          </a:p>
+        </p:txBody>
+      </p:sp>
+      <p:sp>
+        <p:nvSpPr>
+          <p:cNvPr id="23" name="Rectangle 22">
+            <a:extLst>
+              <a:ext uri="{FF2B5EF4-FFF2-40B4-BE49-F238E27FC236}">
+                <a16:creationId xmlns:a16="http://schemas.microsoft.com/office/drawing/2014/main" id="{60DDE7E8-1641-7542-95BA-BEB100C4E62E}"/>
+              </a:ext>
+            </a:extLst>
+          </p:cNvPr>
+          <p:cNvSpPr/>
+          <p:nvPr/>
+        </p:nvSpPr>
+        <p:spPr>
+          <a:xfrm>
+            <a:off x="2703617" y="1635101"/>
+            <a:ext cx="914400" cy="456199"/>
+          </a:xfrm>
+          <a:prstGeom prst="rect">
+            <a:avLst/>
+          </a:prstGeom>
+          <a:noFill/>
+          <a:ln>
+            <a:solidFill>
+              <a:srgbClr val="0000FF"/>
+            </a:solidFill>
+          </a:ln>
+          <a:effectLst/>
+        </p:spPr>
+        <p:style>
+          <a:lnRef idx="2">
+            <a:schemeClr val="accent1">
+              <a:shade val="50000"/>
+            </a:schemeClr>
+          </a:lnRef>
+          <a:fillRef idx="1">
+            <a:schemeClr val="accent1"/>
+          </a:fillRef>
+          <a:effectRef idx="0">
+            <a:schemeClr val="accent1"/>
+          </a:effectRef>
+          <a:fontRef idx="minor">
+            <a:schemeClr val="lt1"/>
+          </a:fontRef>
+        </p:style>
+        <p:txBody>
+          <a:bodyPr rtlCol="0" anchor="ctr"/>
+          <a:lstStyle/>
+          <a:p>
+            <a:pPr marL="0" marR="0" indent="0" algn="ctr" defTabSz="685800" rtl="0" eaLnBrk="1" fontAlgn="auto" latinLnBrk="0" hangingPunct="1">
+              <a:lnSpc>
+                <a:spcPct val="100000"/>
+              </a:lnSpc>
+              <a:spcBef>
+                <a:spcPts val="0"/>
+              </a:spcBef>
+              <a:spcAft>
+                <a:spcPts val="0"/>
+              </a:spcAft>
+              <a:buClrTx/>
+              <a:buSzTx/>
+              <a:buFontTx/>
+              <a:buNone/>
+              <a:tabLst/>
+            </a:pPr>
+            <a:r>
+              <a:rPr kumimoji="0" lang="en-US" sz="1000" b="0" i="0" u="none" strike="noStrike" kern="1200" cap="none" spc="0" normalizeH="0" baseline="0" noProof="0" dirty="0">
+                <a:ln>
+                  <a:noFill/>
+                </a:ln>
+                <a:solidFill>
+                  <a:srgbClr val="0000FF"/>
+                </a:solidFill>
+                <a:effectLst/>
+                <a:uLnTx/>
+                <a:uFillTx/>
+                <a:latin typeface="Arial"/>
+                <a:ea typeface="+mn-ea"/>
+                <a:cs typeface="+mn-cs"/>
+              </a:rPr>
+              <a:t>Batch time t</a:t>
+            </a:r>
+          </a:p>
+        </p:txBody>
+      </p:sp>
+      <p:sp>
+        <p:nvSpPr>
+          <p:cNvPr id="24" name="Rectangle 23">
+            <a:extLst>
+              <a:ext uri="{FF2B5EF4-FFF2-40B4-BE49-F238E27FC236}">
+                <a16:creationId xmlns:a16="http://schemas.microsoft.com/office/drawing/2014/main" id="{A4E4353A-C70E-824B-96B4-9C5A1C73D5D5}"/>
+              </a:ext>
+            </a:extLst>
+          </p:cNvPr>
+          <p:cNvSpPr/>
+          <p:nvPr/>
+        </p:nvSpPr>
+        <p:spPr>
+          <a:xfrm>
+            <a:off x="3780113" y="1630925"/>
+            <a:ext cx="914400" cy="456199"/>
+          </a:xfrm>
+          <a:prstGeom prst="rect">
+            <a:avLst/>
+          </a:prstGeom>
+          <a:noFill/>
+          <a:ln>
+            <a:solidFill>
+              <a:srgbClr val="0000FF"/>
+            </a:solidFill>
+          </a:ln>
+          <a:effectLst/>
+        </p:spPr>
+        <p:style>
+          <a:lnRef idx="2">
+            <a:schemeClr val="accent1">
+              <a:shade val="50000"/>
+            </a:schemeClr>
+          </a:lnRef>
+          <a:fillRef idx="1">
+            <a:schemeClr val="accent1"/>
+          </a:fillRef>
+          <a:effectRef idx="0">
+            <a:schemeClr val="accent1"/>
+          </a:effectRef>
+          <a:fontRef idx="minor">
+            <a:schemeClr val="lt1"/>
+          </a:fontRef>
+        </p:style>
+        <p:txBody>
+          <a:bodyPr rtlCol="0" anchor="ctr"/>
+          <a:lstStyle/>
+          <a:p>
+            <a:pPr marL="0" marR="0" indent="0" algn="ctr" defTabSz="685800" rtl="0" eaLnBrk="1" fontAlgn="auto" latinLnBrk="0" hangingPunct="1">
+              <a:lnSpc>
+                <a:spcPct val="100000"/>
+              </a:lnSpc>
+              <a:spcBef>
+                <a:spcPts val="0"/>
+              </a:spcBef>
+              <a:spcAft>
+                <a:spcPts val="0"/>
+              </a:spcAft>
+              <a:buClrTx/>
+              <a:buSzTx/>
+              <a:buFontTx/>
+              <a:buNone/>
+              <a:tabLst/>
+            </a:pPr>
+            <a:r>
+              <a:rPr kumimoji="0" lang="en-US" sz="1000" b="0" i="0" u="none" strike="noStrike" kern="1200" cap="none" spc="0" normalizeH="0" baseline="0" noProof="0" dirty="0">
+                <a:ln>
+                  <a:noFill/>
+                </a:ln>
+                <a:solidFill>
+                  <a:srgbClr val="0000FF"/>
+                </a:solidFill>
+                <a:effectLst/>
+                <a:uLnTx/>
+                <a:uFillTx/>
+                <a:latin typeface="Arial"/>
+                <a:ea typeface="+mn-ea"/>
+                <a:cs typeface="+mn-cs"/>
+              </a:rPr>
+              <a:t>Batch time t + dt</a:t>
+            </a:r>
+          </a:p>
+        </p:txBody>
+      </p:sp>
+      <p:sp>
+        <p:nvSpPr>
+          <p:cNvPr id="25" name="Rectangle 24">
+            <a:extLst>
+              <a:ext uri="{FF2B5EF4-FFF2-40B4-BE49-F238E27FC236}">
+                <a16:creationId xmlns:a16="http://schemas.microsoft.com/office/drawing/2014/main" id="{710DD3A0-811B-234E-B3E8-53BBAA4521B3}"/>
+              </a:ext>
+            </a:extLst>
+          </p:cNvPr>
+          <p:cNvSpPr/>
+          <p:nvPr/>
+        </p:nvSpPr>
+        <p:spPr>
+          <a:xfrm>
+            <a:off x="4835591" y="1630925"/>
+            <a:ext cx="914400" cy="456199"/>
+          </a:xfrm>
+          <a:prstGeom prst="rect">
+            <a:avLst/>
+          </a:prstGeom>
+          <a:noFill/>
+          <a:ln>
+            <a:solidFill>
+              <a:srgbClr val="0000FF"/>
+            </a:solidFill>
+          </a:ln>
+          <a:effectLst/>
+        </p:spPr>
+        <p:style>
+          <a:lnRef idx="2">
+            <a:schemeClr val="accent1">
+              <a:shade val="50000"/>
+            </a:schemeClr>
+          </a:lnRef>
+          <a:fillRef idx="1">
+            <a:schemeClr val="accent1"/>
+          </a:fillRef>
+          <a:effectRef idx="0">
+            <a:schemeClr val="accent1"/>
+          </a:effectRef>
+          <a:fontRef idx="minor">
+            <a:schemeClr val="lt1"/>
+          </a:fontRef>
+        </p:style>
+        <p:txBody>
+          <a:bodyPr rtlCol="0" anchor="ctr"/>
+          <a:lstStyle/>
+          <a:p>
+            <a:pPr algn="ctr"/>
+            <a:r>
+              <a:rPr kumimoji="0" lang="en-US" sz="1000" b="0" i="0" u="none" strike="noStrike" kern="1200" cap="none" spc="0" normalizeH="0" baseline="0" noProof="0" dirty="0">
+                <a:ln>
+                  <a:noFill/>
+                </a:ln>
+                <a:solidFill>
+                  <a:srgbClr val="0000FF"/>
+                </a:solidFill>
+                <a:effectLst/>
+                <a:uLnTx/>
+                <a:uFillTx/>
+                <a:latin typeface="Arial"/>
+                <a:ea typeface="+mn-ea"/>
+                <a:cs typeface="+mn-cs"/>
+              </a:rPr>
+              <a:t>Batch </a:t>
+            </a:r>
+            <a:r>
+              <a:rPr lang="en-US" sz="1000" dirty="0">
+                <a:solidFill>
+                  <a:srgbClr val="0000FF"/>
+                </a:solidFill>
+              </a:rPr>
+              <a:t>time t + 2*dt</a:t>
+            </a:r>
+            <a:endParaRPr kumimoji="0" lang="en-US" sz="1000" b="0" i="0" u="none" strike="noStrike" kern="1200" cap="none" spc="0" normalizeH="0" baseline="0" noProof="0" dirty="0">
+              <a:ln>
+                <a:noFill/>
+              </a:ln>
+              <a:solidFill>
+                <a:srgbClr val="0000FF"/>
+              </a:solidFill>
+              <a:effectLst/>
+              <a:uLnTx/>
+              <a:uFillTx/>
+              <a:latin typeface="Arial"/>
+              <a:ea typeface="+mn-ea"/>
+              <a:cs typeface="+mn-cs"/>
+            </a:endParaRPr>
+          </a:p>
+        </p:txBody>
+      </p:sp>
+      <p:sp>
+        <p:nvSpPr>
+          <p:cNvPr id="26" name="Rectangle 25">
+            <a:extLst>
+              <a:ext uri="{FF2B5EF4-FFF2-40B4-BE49-F238E27FC236}">
+                <a16:creationId xmlns:a16="http://schemas.microsoft.com/office/drawing/2014/main" id="{CB551CE8-3726-D646-960B-B7DA0154DDEC}"/>
+              </a:ext>
+            </a:extLst>
+          </p:cNvPr>
+          <p:cNvSpPr/>
+          <p:nvPr/>
+        </p:nvSpPr>
+        <p:spPr>
+          <a:xfrm>
+            <a:off x="2707755" y="2986949"/>
+            <a:ext cx="907962" cy="915978"/>
+          </a:xfrm>
+          <a:prstGeom prst="rect">
+            <a:avLst/>
+          </a:prstGeom>
+          <a:solidFill>
+            <a:schemeClr val="accent2">
+              <a:lumMod val="60000"/>
+              <a:lumOff val="40000"/>
+            </a:schemeClr>
+          </a:solidFill>
+          <a:ln>
+            <a:noFill/>
+          </a:ln>
+          <a:effectLst>
+            <a:outerShdw blurRad="50800" dist="38100" dir="5400000" algn="t" rotWithShape="0">
+              <a:prstClr val="black">
+                <a:alpha val="40000"/>
+              </a:prstClr>
+            </a:outerShdw>
+          </a:effectLst>
+        </p:spPr>
+        <p:style>
+          <a:lnRef idx="2">
+            <a:schemeClr val="accent1">
+              <a:shade val="50000"/>
+            </a:schemeClr>
+          </a:lnRef>
+          <a:fillRef idx="1">
+            <a:schemeClr val="accent1"/>
+          </a:fillRef>
+          <a:effectRef idx="0">
+            <a:schemeClr val="accent1"/>
+          </a:effectRef>
+          <a:fontRef idx="minor">
+            <a:schemeClr val="lt1"/>
+          </a:fontRef>
+        </p:style>
+        <p:txBody>
+          <a:bodyPr rtlCol="0" anchor="t"/>
+          <a:lstStyle/>
+          <a:p>
+            <a:pPr marL="0" marR="0" indent="0" algn="ctr" defTabSz="685800" rtl="0" eaLnBrk="1" fontAlgn="auto" latinLnBrk="0" hangingPunct="1">
+              <a:lnSpc>
+                <a:spcPct val="100000"/>
+              </a:lnSpc>
+              <a:spcBef>
+                <a:spcPts val="0"/>
+              </a:spcBef>
+              <a:spcAft>
+                <a:spcPts val="0"/>
+              </a:spcAft>
+              <a:buClrTx/>
+              <a:buSzTx/>
+              <a:buFontTx/>
+              <a:buNone/>
+              <a:tabLst/>
+            </a:pPr>
+            <a:r>
+              <a:rPr lang="en-US" sz="1100" dirty="0">
+                <a:solidFill>
+                  <a:schemeClr val="accent1">
+                    <a:lumMod val="50000"/>
+                  </a:schemeClr>
+                </a:solidFill>
+                <a:latin typeface="Arial"/>
+              </a:rPr>
+              <a:t>Executors</a:t>
+            </a:r>
+            <a:endParaRPr kumimoji="0" lang="en-US" sz="1100" b="0" i="0" u="none" strike="noStrike" kern="1200" cap="none" spc="0" normalizeH="0" baseline="0" noProof="0" dirty="0">
+              <a:ln>
+                <a:noFill/>
+              </a:ln>
+              <a:solidFill>
+                <a:schemeClr val="accent1">
+                  <a:lumMod val="50000"/>
+                </a:schemeClr>
+              </a:solidFill>
+              <a:effectLst/>
+              <a:uLnTx/>
+              <a:uFillTx/>
+              <a:latin typeface="Arial"/>
+              <a:ea typeface="+mn-ea"/>
+              <a:cs typeface="+mn-cs"/>
+            </a:endParaRPr>
+          </a:p>
+        </p:txBody>
+      </p:sp>
+      <p:grpSp>
+        <p:nvGrpSpPr>
+          <p:cNvPr id="33" name="Group 32">
+            <a:extLst>
+              <a:ext uri="{FF2B5EF4-FFF2-40B4-BE49-F238E27FC236}">
+                <a16:creationId xmlns:a16="http://schemas.microsoft.com/office/drawing/2014/main" id="{5AD53960-50E5-5541-9AA2-C042F3B7F0A8}"/>
+              </a:ext>
+            </a:extLst>
+          </p:cNvPr>
+          <p:cNvGrpSpPr/>
+          <p:nvPr/>
+        </p:nvGrpSpPr>
+        <p:grpSpPr>
+          <a:xfrm>
+            <a:off x="2696706" y="3311913"/>
+            <a:ext cx="269518" cy="591014"/>
+            <a:chOff x="2696706" y="3311913"/>
+            <a:chExt cx="269518" cy="591014"/>
+          </a:xfrm>
+        </p:grpSpPr>
+        <p:cxnSp>
+          <p:nvCxnSpPr>
+            <p:cNvPr id="15" name="Straight Connector 14">
+              <a:extLst>
+                <a:ext uri="{FF2B5EF4-FFF2-40B4-BE49-F238E27FC236}">
+                  <a16:creationId xmlns:a16="http://schemas.microsoft.com/office/drawing/2014/main" id="{8A83B60D-9BA8-E842-98C0-7EEF808CCACA}"/>
+                </a:ext>
+              </a:extLst>
+            </p:cNvPr>
+            <p:cNvCxnSpPr>
+              <a:cxnSpLocks/>
+            </p:cNvCxnSpPr>
+            <p:nvPr/>
+          </p:nvCxnSpPr>
+          <p:spPr>
+            <a:xfrm>
+              <a:off x="2918740" y="3435377"/>
+              <a:ext cx="0" cy="467550"/>
+            </a:xfrm>
+            <a:prstGeom prst="line">
+              <a:avLst/>
+            </a:prstGeom>
+            <a:ln>
+              <a:solidFill>
+                <a:srgbClr val="0000FF"/>
+              </a:solidFill>
+            </a:ln>
+            <a:effectLst/>
+          </p:spPr>
+          <p:style>
+            <a:lnRef idx="2">
+              <a:schemeClr val="accent1"/>
+            </a:lnRef>
+            <a:fillRef idx="0">
+              <a:schemeClr val="accent1"/>
+            </a:fillRef>
+            <a:effectRef idx="1">
+              <a:schemeClr val="accent1"/>
+            </a:effectRef>
+            <a:fontRef idx="minor">
+              <a:schemeClr val="tx1"/>
+            </a:fontRef>
+          </p:style>
+        </p:cxnSp>
+        <p:sp>
+          <p:nvSpPr>
+            <p:cNvPr id="29" name="Parallelogram 28">
+              <a:extLst>
+                <a:ext uri="{FF2B5EF4-FFF2-40B4-BE49-F238E27FC236}">
+                  <a16:creationId xmlns:a16="http://schemas.microsoft.com/office/drawing/2014/main" id="{7E8B1E19-199A-B341-B37A-5A5A874886C1}"/>
+                </a:ext>
+              </a:extLst>
+            </p:cNvPr>
+            <p:cNvSpPr/>
+            <p:nvPr/>
+          </p:nvSpPr>
+          <p:spPr>
+            <a:xfrm>
+              <a:off x="2696706" y="3311913"/>
+              <a:ext cx="269518" cy="127814"/>
+            </a:xfrm>
+            <a:prstGeom prst="parallelogram">
+              <a:avLst/>
+            </a:prstGeom>
+            <a:solidFill>
+              <a:srgbClr val="0000FF"/>
+            </a:solidFill>
+            <a:ln>
+              <a:noFill/>
+            </a:ln>
+          </p:spPr>
+          <p:style>
+            <a:lnRef idx="2">
+              <a:schemeClr val="accent1">
+                <a:shade val="50000"/>
+              </a:schemeClr>
+            </a:lnRef>
+            <a:fillRef idx="1">
+              <a:schemeClr val="accent1"/>
+            </a:fillRef>
+            <a:effectRef idx="0">
+              <a:schemeClr val="accent1"/>
+            </a:effectRef>
+            <a:fontRef idx="minor">
+              <a:schemeClr val="lt1"/>
+            </a:fontRef>
+          </p:style>
+          <p:txBody>
+            <a:bodyPr rtlCol="0" anchor="t"/>
+            <a:lstStyle/>
+            <a:p>
+              <a:pPr marL="0" marR="0" indent="0" algn="l" defTabSz="685800" rtl="0" eaLnBrk="1" fontAlgn="auto" latinLnBrk="0" hangingPunct="1">
+                <a:lnSpc>
+                  <a:spcPct val="100000"/>
+                </a:lnSpc>
+                <a:spcBef>
+                  <a:spcPts val="0"/>
+                </a:spcBef>
+                <a:spcAft>
+                  <a:spcPts val="0"/>
+                </a:spcAft>
+                <a:buClrTx/>
+                <a:buSzTx/>
+                <a:buFontTx/>
+                <a:buNone/>
+                <a:tabLst/>
+              </a:pPr>
+              <a:endParaRPr kumimoji="0" lang="en-US" sz="1000" b="0" i="0" u="none" strike="noStrike" kern="1200" cap="none" spc="0" normalizeH="0" baseline="0" noProof="0" dirty="0">
+                <a:ln>
+                  <a:noFill/>
+                </a:ln>
+                <a:solidFill>
+                  <a:prstClr val="white"/>
+                </a:solidFill>
+                <a:effectLst/>
+                <a:uLnTx/>
+                <a:uFillTx/>
+                <a:latin typeface="Arial"/>
+                <a:ea typeface="+mn-ea"/>
+                <a:cs typeface="+mn-cs"/>
+              </a:endParaRPr>
+            </a:p>
+          </p:txBody>
+        </p:sp>
+      </p:grpSp>
+      <p:grpSp>
+        <p:nvGrpSpPr>
+          <p:cNvPr id="34" name="Group 33">
+            <a:extLst>
+              <a:ext uri="{FF2B5EF4-FFF2-40B4-BE49-F238E27FC236}">
+                <a16:creationId xmlns:a16="http://schemas.microsoft.com/office/drawing/2014/main" id="{BEA59709-2921-7D46-93FF-7AD21091F7DE}"/>
+              </a:ext>
+            </a:extLst>
+          </p:cNvPr>
+          <p:cNvGrpSpPr/>
+          <p:nvPr/>
+        </p:nvGrpSpPr>
+        <p:grpSpPr>
+          <a:xfrm>
+            <a:off x="2971767" y="3308199"/>
+            <a:ext cx="269518" cy="591014"/>
+            <a:chOff x="2696706" y="3311913"/>
+            <a:chExt cx="269518" cy="591014"/>
+          </a:xfrm>
+        </p:grpSpPr>
+        <p:cxnSp>
+          <p:nvCxnSpPr>
+            <p:cNvPr id="35" name="Straight Connector 34">
+              <a:extLst>
+                <a:ext uri="{FF2B5EF4-FFF2-40B4-BE49-F238E27FC236}">
+                  <a16:creationId xmlns:a16="http://schemas.microsoft.com/office/drawing/2014/main" id="{C5C4E328-F013-5F42-B004-2E6B8FFFF381}"/>
+                </a:ext>
+              </a:extLst>
+            </p:cNvPr>
+            <p:cNvCxnSpPr>
+              <a:cxnSpLocks/>
+            </p:cNvCxnSpPr>
+            <p:nvPr/>
+          </p:nvCxnSpPr>
+          <p:spPr>
+            <a:xfrm>
+              <a:off x="2918740" y="3435377"/>
+              <a:ext cx="0" cy="467550"/>
+            </a:xfrm>
+            <a:prstGeom prst="line">
+              <a:avLst/>
+            </a:prstGeom>
+            <a:ln>
+              <a:solidFill>
+                <a:srgbClr val="0000FF"/>
+              </a:solidFill>
+            </a:ln>
+            <a:effectLst/>
+          </p:spPr>
+          <p:style>
+            <a:lnRef idx="2">
+              <a:schemeClr val="accent1"/>
+            </a:lnRef>
+            <a:fillRef idx="0">
+              <a:schemeClr val="accent1"/>
+            </a:fillRef>
+            <a:effectRef idx="1">
+              <a:schemeClr val="accent1"/>
+            </a:effectRef>
+            <a:fontRef idx="minor">
+              <a:schemeClr val="tx1"/>
+            </a:fontRef>
+          </p:style>
+        </p:cxnSp>
+        <p:sp>
+          <p:nvSpPr>
+            <p:cNvPr id="36" name="Parallelogram 35">
+              <a:extLst>
+                <a:ext uri="{FF2B5EF4-FFF2-40B4-BE49-F238E27FC236}">
+                  <a16:creationId xmlns:a16="http://schemas.microsoft.com/office/drawing/2014/main" id="{C8A1EE03-C926-C74A-8C47-4015312B985A}"/>
+                </a:ext>
+              </a:extLst>
+            </p:cNvPr>
+            <p:cNvSpPr/>
+            <p:nvPr/>
+          </p:nvSpPr>
+          <p:spPr>
+            <a:xfrm>
+              <a:off x="2696706" y="3311913"/>
+              <a:ext cx="269518" cy="127814"/>
+            </a:xfrm>
+            <a:prstGeom prst="parallelogram">
+              <a:avLst/>
+            </a:prstGeom>
+            <a:solidFill>
+              <a:srgbClr val="0000FF"/>
+            </a:solidFill>
+            <a:ln>
+              <a:noFill/>
+            </a:ln>
+          </p:spPr>
+          <p:style>
+            <a:lnRef idx="2">
+              <a:schemeClr val="accent1">
+                <a:shade val="50000"/>
+              </a:schemeClr>
+            </a:lnRef>
+            <a:fillRef idx="1">
+              <a:schemeClr val="accent1"/>
+            </a:fillRef>
+            <a:effectRef idx="0">
+              <a:schemeClr val="accent1"/>
+            </a:effectRef>
+            <a:fontRef idx="minor">
+              <a:schemeClr val="lt1"/>
+            </a:fontRef>
+          </p:style>
+          <p:txBody>
+            <a:bodyPr rtlCol="0" anchor="t"/>
+            <a:lstStyle/>
+            <a:p>
+              <a:pPr marL="0" marR="0" indent="0" algn="l" defTabSz="685800" rtl="0" eaLnBrk="1" fontAlgn="auto" latinLnBrk="0" hangingPunct="1">
+                <a:lnSpc>
+                  <a:spcPct val="100000"/>
+                </a:lnSpc>
+                <a:spcBef>
+                  <a:spcPts val="0"/>
+                </a:spcBef>
+                <a:spcAft>
+                  <a:spcPts val="0"/>
+                </a:spcAft>
+                <a:buClrTx/>
+                <a:buSzTx/>
+                <a:buFontTx/>
+                <a:buNone/>
+                <a:tabLst/>
+              </a:pPr>
+              <a:endParaRPr kumimoji="0" lang="en-US" sz="1000" b="0" i="0" u="none" strike="noStrike" kern="1200" cap="none" spc="0" normalizeH="0" baseline="0" noProof="0" dirty="0">
+                <a:ln>
+                  <a:noFill/>
+                </a:ln>
+                <a:solidFill>
+                  <a:prstClr val="white"/>
+                </a:solidFill>
+                <a:effectLst/>
+                <a:uLnTx/>
+                <a:uFillTx/>
+                <a:latin typeface="Arial"/>
+                <a:ea typeface="+mn-ea"/>
+                <a:cs typeface="+mn-cs"/>
+              </a:endParaRPr>
+            </a:p>
+          </p:txBody>
+        </p:sp>
+      </p:grpSp>
+      <p:grpSp>
+        <p:nvGrpSpPr>
+          <p:cNvPr id="37" name="Group 36">
+            <a:extLst>
+              <a:ext uri="{FF2B5EF4-FFF2-40B4-BE49-F238E27FC236}">
+                <a16:creationId xmlns:a16="http://schemas.microsoft.com/office/drawing/2014/main" id="{5CCA64A5-2BEA-774F-8A9B-207BFBF289FC}"/>
+              </a:ext>
+            </a:extLst>
+          </p:cNvPr>
+          <p:cNvGrpSpPr/>
+          <p:nvPr/>
+        </p:nvGrpSpPr>
+        <p:grpSpPr>
+          <a:xfrm>
+            <a:off x="3261700" y="3308198"/>
+            <a:ext cx="269518" cy="591014"/>
+            <a:chOff x="2696706" y="3311913"/>
+            <a:chExt cx="269518" cy="591014"/>
+          </a:xfrm>
+        </p:grpSpPr>
+        <p:cxnSp>
+          <p:nvCxnSpPr>
+            <p:cNvPr id="38" name="Straight Connector 37">
+              <a:extLst>
+                <a:ext uri="{FF2B5EF4-FFF2-40B4-BE49-F238E27FC236}">
+                  <a16:creationId xmlns:a16="http://schemas.microsoft.com/office/drawing/2014/main" id="{B9152EC2-3B37-3B46-8A72-90C9AEB81F25}"/>
+                </a:ext>
+              </a:extLst>
+            </p:cNvPr>
+            <p:cNvCxnSpPr>
+              <a:cxnSpLocks/>
+            </p:cNvCxnSpPr>
+            <p:nvPr/>
+          </p:nvCxnSpPr>
+          <p:spPr>
+            <a:xfrm>
+              <a:off x="2918740" y="3435377"/>
+              <a:ext cx="0" cy="467550"/>
+            </a:xfrm>
+            <a:prstGeom prst="line">
+              <a:avLst/>
+            </a:prstGeom>
+            <a:ln>
+              <a:solidFill>
+                <a:srgbClr val="0000FF"/>
+              </a:solidFill>
+            </a:ln>
+            <a:effectLst/>
+          </p:spPr>
+          <p:style>
+            <a:lnRef idx="2">
+              <a:schemeClr val="accent1"/>
+            </a:lnRef>
+            <a:fillRef idx="0">
+              <a:schemeClr val="accent1"/>
+            </a:fillRef>
+            <a:effectRef idx="1">
+              <a:schemeClr val="accent1"/>
+            </a:effectRef>
+            <a:fontRef idx="minor">
+              <a:schemeClr val="tx1"/>
+            </a:fontRef>
+          </p:style>
+        </p:cxnSp>
+        <p:sp>
+          <p:nvSpPr>
+            <p:cNvPr id="39" name="Parallelogram 38">
+              <a:extLst>
+                <a:ext uri="{FF2B5EF4-FFF2-40B4-BE49-F238E27FC236}">
+                  <a16:creationId xmlns:a16="http://schemas.microsoft.com/office/drawing/2014/main" id="{C12E9081-C03F-DF4D-B819-5AC24B028250}"/>
+                </a:ext>
+              </a:extLst>
+            </p:cNvPr>
+            <p:cNvSpPr/>
+            <p:nvPr/>
+          </p:nvSpPr>
+          <p:spPr>
+            <a:xfrm>
+              <a:off x="2696706" y="3311913"/>
+              <a:ext cx="269518" cy="127814"/>
+            </a:xfrm>
+            <a:prstGeom prst="parallelogram">
+              <a:avLst/>
+            </a:prstGeom>
+            <a:solidFill>
+              <a:srgbClr val="0000FF"/>
+            </a:solidFill>
+            <a:ln>
+              <a:noFill/>
+            </a:ln>
+          </p:spPr>
+          <p:style>
+            <a:lnRef idx="2">
+              <a:schemeClr val="accent1">
+                <a:shade val="50000"/>
+              </a:schemeClr>
+            </a:lnRef>
+            <a:fillRef idx="1">
+              <a:schemeClr val="accent1"/>
+            </a:fillRef>
+            <a:effectRef idx="0">
+              <a:schemeClr val="accent1"/>
+            </a:effectRef>
+            <a:fontRef idx="minor">
+              <a:schemeClr val="lt1"/>
+            </a:fontRef>
+          </p:style>
+          <p:txBody>
+            <a:bodyPr rtlCol="0" anchor="t"/>
+            <a:lstStyle/>
+            <a:p>
+              <a:pPr marL="0" marR="0" indent="0" algn="l" defTabSz="685800" rtl="0" eaLnBrk="1" fontAlgn="auto" latinLnBrk="0" hangingPunct="1">
+                <a:lnSpc>
+                  <a:spcPct val="100000"/>
+                </a:lnSpc>
+                <a:spcBef>
+                  <a:spcPts val="0"/>
+                </a:spcBef>
+                <a:spcAft>
+                  <a:spcPts val="0"/>
+                </a:spcAft>
+                <a:buClrTx/>
+                <a:buSzTx/>
+                <a:buFontTx/>
+                <a:buNone/>
+                <a:tabLst/>
+              </a:pPr>
+              <a:endParaRPr kumimoji="0" lang="en-US" sz="1000" b="0" i="0" u="none" strike="noStrike" kern="1200" cap="none" spc="0" normalizeH="0" baseline="0" noProof="0" dirty="0">
+                <a:ln>
+                  <a:noFill/>
+                </a:ln>
+                <a:solidFill>
+                  <a:prstClr val="white"/>
+                </a:solidFill>
+                <a:effectLst/>
+                <a:uLnTx/>
+                <a:uFillTx/>
+                <a:latin typeface="Arial"/>
+                <a:ea typeface="+mn-ea"/>
+                <a:cs typeface="+mn-cs"/>
+              </a:endParaRPr>
+            </a:p>
+          </p:txBody>
+        </p:sp>
+      </p:grpSp>
+      <p:sp>
+        <p:nvSpPr>
+          <p:cNvPr id="40" name="Rectangle 39">
+            <a:extLst>
+              <a:ext uri="{FF2B5EF4-FFF2-40B4-BE49-F238E27FC236}">
+                <a16:creationId xmlns:a16="http://schemas.microsoft.com/office/drawing/2014/main" id="{A88EF219-971E-C940-9A3E-A158283C7BB3}"/>
+              </a:ext>
+            </a:extLst>
+          </p:cNvPr>
+          <p:cNvSpPr/>
+          <p:nvPr/>
+        </p:nvSpPr>
+        <p:spPr>
+          <a:xfrm>
+            <a:off x="3782126" y="2983234"/>
+            <a:ext cx="907962" cy="915978"/>
+          </a:xfrm>
+          <a:prstGeom prst="rect">
+            <a:avLst/>
+          </a:prstGeom>
+          <a:solidFill>
+            <a:schemeClr val="accent2">
+              <a:lumMod val="60000"/>
+              <a:lumOff val="40000"/>
+            </a:schemeClr>
+          </a:solidFill>
+          <a:ln>
+            <a:noFill/>
+          </a:ln>
+          <a:effectLst>
+            <a:outerShdw blurRad="50800" dist="38100" dir="5400000" algn="t" rotWithShape="0">
+              <a:prstClr val="black">
+                <a:alpha val="40000"/>
+              </a:prstClr>
+            </a:outerShdw>
+          </a:effectLst>
+        </p:spPr>
+        <p:style>
+          <a:lnRef idx="2">
+            <a:schemeClr val="accent1">
+              <a:shade val="50000"/>
+            </a:schemeClr>
+          </a:lnRef>
+          <a:fillRef idx="1">
+            <a:schemeClr val="accent1"/>
+          </a:fillRef>
+          <a:effectRef idx="0">
+            <a:schemeClr val="accent1"/>
+          </a:effectRef>
+          <a:fontRef idx="minor">
+            <a:schemeClr val="lt1"/>
+          </a:fontRef>
+        </p:style>
+        <p:txBody>
+          <a:bodyPr rtlCol="0" anchor="t"/>
+          <a:lstStyle/>
+          <a:p>
+            <a:pPr marL="0" marR="0" indent="0" algn="ctr" defTabSz="685800" rtl="0" eaLnBrk="1" fontAlgn="auto" latinLnBrk="0" hangingPunct="1">
+              <a:lnSpc>
+                <a:spcPct val="100000"/>
+              </a:lnSpc>
+              <a:spcBef>
+                <a:spcPts val="0"/>
+              </a:spcBef>
+              <a:spcAft>
+                <a:spcPts val="0"/>
+              </a:spcAft>
+              <a:buClrTx/>
+              <a:buSzTx/>
+              <a:buFontTx/>
+              <a:buNone/>
+              <a:tabLst/>
+            </a:pPr>
+            <a:r>
+              <a:rPr lang="en-US" sz="1100" dirty="0">
+                <a:solidFill>
+                  <a:schemeClr val="accent1">
+                    <a:lumMod val="50000"/>
+                  </a:schemeClr>
+                </a:solidFill>
+                <a:latin typeface="Arial"/>
+              </a:rPr>
+              <a:t>Executors</a:t>
+            </a:r>
+            <a:endParaRPr kumimoji="0" lang="en-US" sz="1100" b="0" i="0" u="none" strike="noStrike" kern="1200" cap="none" spc="0" normalizeH="0" baseline="0" noProof="0" dirty="0">
+              <a:ln>
+                <a:noFill/>
+              </a:ln>
+              <a:solidFill>
+                <a:schemeClr val="accent1">
+                  <a:lumMod val="50000"/>
+                </a:schemeClr>
+              </a:solidFill>
+              <a:effectLst/>
+              <a:uLnTx/>
+              <a:uFillTx/>
+              <a:latin typeface="Arial"/>
+              <a:ea typeface="+mn-ea"/>
+              <a:cs typeface="+mn-cs"/>
+            </a:endParaRPr>
+          </a:p>
+        </p:txBody>
+      </p:sp>
+      <p:grpSp>
+        <p:nvGrpSpPr>
+          <p:cNvPr id="41" name="Group 40">
+            <a:extLst>
+              <a:ext uri="{FF2B5EF4-FFF2-40B4-BE49-F238E27FC236}">
+                <a16:creationId xmlns:a16="http://schemas.microsoft.com/office/drawing/2014/main" id="{C97C351D-83DC-F046-95A9-CC263051E579}"/>
+              </a:ext>
+            </a:extLst>
+          </p:cNvPr>
+          <p:cNvGrpSpPr/>
+          <p:nvPr/>
+        </p:nvGrpSpPr>
+        <p:grpSpPr>
+          <a:xfrm>
+            <a:off x="3771077" y="3308198"/>
+            <a:ext cx="269518" cy="591014"/>
+            <a:chOff x="2696706" y="3311913"/>
+            <a:chExt cx="269518" cy="591014"/>
+          </a:xfrm>
+        </p:grpSpPr>
+        <p:cxnSp>
+          <p:nvCxnSpPr>
+            <p:cNvPr id="42" name="Straight Connector 41">
+              <a:extLst>
+                <a:ext uri="{FF2B5EF4-FFF2-40B4-BE49-F238E27FC236}">
+                  <a16:creationId xmlns:a16="http://schemas.microsoft.com/office/drawing/2014/main" id="{CB7D63A9-9265-2C4B-A9A1-CBD59E2B92D5}"/>
+                </a:ext>
+              </a:extLst>
+            </p:cNvPr>
+            <p:cNvCxnSpPr>
+              <a:cxnSpLocks/>
+            </p:cNvCxnSpPr>
+            <p:nvPr/>
+          </p:nvCxnSpPr>
+          <p:spPr>
+            <a:xfrm>
+              <a:off x="2918740" y="3435377"/>
+              <a:ext cx="0" cy="467550"/>
+            </a:xfrm>
+            <a:prstGeom prst="line">
+              <a:avLst/>
+            </a:prstGeom>
+            <a:ln>
+              <a:solidFill>
+                <a:srgbClr val="0000FF"/>
+              </a:solidFill>
+            </a:ln>
+            <a:effectLst/>
+          </p:spPr>
+          <p:style>
+            <a:lnRef idx="2">
+              <a:schemeClr val="accent1"/>
+            </a:lnRef>
+            <a:fillRef idx="0">
+              <a:schemeClr val="accent1"/>
+            </a:fillRef>
+            <a:effectRef idx="1">
+              <a:schemeClr val="accent1"/>
+            </a:effectRef>
+            <a:fontRef idx="minor">
+              <a:schemeClr val="tx1"/>
+            </a:fontRef>
+          </p:style>
+        </p:cxnSp>
+        <p:sp>
+          <p:nvSpPr>
+            <p:cNvPr id="43" name="Parallelogram 42">
+              <a:extLst>
+                <a:ext uri="{FF2B5EF4-FFF2-40B4-BE49-F238E27FC236}">
+                  <a16:creationId xmlns:a16="http://schemas.microsoft.com/office/drawing/2014/main" id="{F4424335-5246-7849-A49D-0F209FDA795E}"/>
+                </a:ext>
+              </a:extLst>
+            </p:cNvPr>
+            <p:cNvSpPr/>
+            <p:nvPr/>
+          </p:nvSpPr>
+          <p:spPr>
+            <a:xfrm>
+              <a:off x="2696706" y="3311913"/>
+              <a:ext cx="269518" cy="127814"/>
+            </a:xfrm>
+            <a:prstGeom prst="parallelogram">
+              <a:avLst/>
+            </a:prstGeom>
+            <a:solidFill>
+              <a:srgbClr val="0000FF"/>
+            </a:solidFill>
+            <a:ln>
+              <a:noFill/>
+            </a:ln>
+          </p:spPr>
+          <p:style>
+            <a:lnRef idx="2">
+              <a:schemeClr val="accent1">
+                <a:shade val="50000"/>
+              </a:schemeClr>
+            </a:lnRef>
+            <a:fillRef idx="1">
+              <a:schemeClr val="accent1"/>
+            </a:fillRef>
+            <a:effectRef idx="0">
+              <a:schemeClr val="accent1"/>
+            </a:effectRef>
+            <a:fontRef idx="minor">
+              <a:schemeClr val="lt1"/>
+            </a:fontRef>
+          </p:style>
+          <p:txBody>
+            <a:bodyPr rtlCol="0" anchor="t"/>
+            <a:lstStyle/>
+            <a:p>
+              <a:pPr marL="0" marR="0" indent="0" algn="l" defTabSz="685800" rtl="0" eaLnBrk="1" fontAlgn="auto" latinLnBrk="0" hangingPunct="1">
+                <a:lnSpc>
+                  <a:spcPct val="100000"/>
+                </a:lnSpc>
+                <a:spcBef>
+                  <a:spcPts val="0"/>
+                </a:spcBef>
+                <a:spcAft>
+                  <a:spcPts val="0"/>
+                </a:spcAft>
+                <a:buClrTx/>
+                <a:buSzTx/>
+                <a:buFontTx/>
+                <a:buNone/>
+                <a:tabLst/>
+              </a:pPr>
+              <a:endParaRPr kumimoji="0" lang="en-US" sz="1000" b="0" i="0" u="none" strike="noStrike" kern="1200" cap="none" spc="0" normalizeH="0" baseline="0" noProof="0" dirty="0">
+                <a:ln>
+                  <a:noFill/>
+                </a:ln>
+                <a:solidFill>
+                  <a:prstClr val="white"/>
+                </a:solidFill>
+                <a:effectLst/>
+                <a:uLnTx/>
+                <a:uFillTx/>
+                <a:latin typeface="Arial"/>
+                <a:ea typeface="+mn-ea"/>
+                <a:cs typeface="+mn-cs"/>
+              </a:endParaRPr>
+            </a:p>
+          </p:txBody>
+        </p:sp>
+      </p:grpSp>
+      <p:grpSp>
+        <p:nvGrpSpPr>
+          <p:cNvPr id="44" name="Group 43">
+            <a:extLst>
+              <a:ext uri="{FF2B5EF4-FFF2-40B4-BE49-F238E27FC236}">
+                <a16:creationId xmlns:a16="http://schemas.microsoft.com/office/drawing/2014/main" id="{E50E1826-0199-994B-966C-0036C6A6111C}"/>
+              </a:ext>
+            </a:extLst>
+          </p:cNvPr>
+          <p:cNvGrpSpPr/>
+          <p:nvPr/>
+        </p:nvGrpSpPr>
+        <p:grpSpPr>
+          <a:xfrm>
+            <a:off x="4046138" y="3304484"/>
+            <a:ext cx="269518" cy="591014"/>
+            <a:chOff x="2696706" y="3311913"/>
+            <a:chExt cx="269518" cy="591014"/>
+          </a:xfrm>
+        </p:grpSpPr>
+        <p:cxnSp>
+          <p:nvCxnSpPr>
+            <p:cNvPr id="45" name="Straight Connector 44">
+              <a:extLst>
+                <a:ext uri="{FF2B5EF4-FFF2-40B4-BE49-F238E27FC236}">
+                  <a16:creationId xmlns:a16="http://schemas.microsoft.com/office/drawing/2014/main" id="{1C3E889A-969D-6949-AA2B-C319C94384A9}"/>
+                </a:ext>
+              </a:extLst>
+            </p:cNvPr>
+            <p:cNvCxnSpPr>
+              <a:cxnSpLocks/>
+            </p:cNvCxnSpPr>
+            <p:nvPr/>
+          </p:nvCxnSpPr>
+          <p:spPr>
+            <a:xfrm>
+              <a:off x="2918740" y="3435377"/>
+              <a:ext cx="0" cy="467550"/>
+            </a:xfrm>
+            <a:prstGeom prst="line">
+              <a:avLst/>
+            </a:prstGeom>
+            <a:ln>
+              <a:solidFill>
+                <a:srgbClr val="0000FF"/>
+              </a:solidFill>
+            </a:ln>
+            <a:effectLst/>
+          </p:spPr>
+          <p:style>
+            <a:lnRef idx="2">
+              <a:schemeClr val="accent1"/>
+            </a:lnRef>
+            <a:fillRef idx="0">
+              <a:schemeClr val="accent1"/>
+            </a:fillRef>
+            <a:effectRef idx="1">
+              <a:schemeClr val="accent1"/>
+            </a:effectRef>
+            <a:fontRef idx="minor">
+              <a:schemeClr val="tx1"/>
+            </a:fontRef>
+          </p:style>
+        </p:cxnSp>
+        <p:sp>
+          <p:nvSpPr>
+            <p:cNvPr id="46" name="Parallelogram 45">
+              <a:extLst>
+                <a:ext uri="{FF2B5EF4-FFF2-40B4-BE49-F238E27FC236}">
+                  <a16:creationId xmlns:a16="http://schemas.microsoft.com/office/drawing/2014/main" id="{DAFB1627-600B-F64F-AF6D-B49FFC1BF4CC}"/>
+                </a:ext>
+              </a:extLst>
+            </p:cNvPr>
+            <p:cNvSpPr/>
+            <p:nvPr/>
+          </p:nvSpPr>
+          <p:spPr>
+            <a:xfrm>
+              <a:off x="2696706" y="3311913"/>
+              <a:ext cx="269518" cy="127814"/>
+            </a:xfrm>
+            <a:prstGeom prst="parallelogram">
+              <a:avLst/>
+            </a:prstGeom>
+            <a:solidFill>
+              <a:srgbClr val="0000FF"/>
+            </a:solidFill>
+            <a:ln>
+              <a:noFill/>
+            </a:ln>
+          </p:spPr>
+          <p:style>
+            <a:lnRef idx="2">
+              <a:schemeClr val="accent1">
+                <a:shade val="50000"/>
+              </a:schemeClr>
+            </a:lnRef>
+            <a:fillRef idx="1">
+              <a:schemeClr val="accent1"/>
+            </a:fillRef>
+            <a:effectRef idx="0">
+              <a:schemeClr val="accent1"/>
+            </a:effectRef>
+            <a:fontRef idx="minor">
+              <a:schemeClr val="lt1"/>
+            </a:fontRef>
+          </p:style>
+          <p:txBody>
+            <a:bodyPr rtlCol="0" anchor="t"/>
+            <a:lstStyle/>
+            <a:p>
+              <a:pPr marL="0" marR="0" indent="0" algn="l" defTabSz="685800" rtl="0" eaLnBrk="1" fontAlgn="auto" latinLnBrk="0" hangingPunct="1">
+                <a:lnSpc>
+                  <a:spcPct val="100000"/>
+                </a:lnSpc>
+                <a:spcBef>
+                  <a:spcPts val="0"/>
+                </a:spcBef>
+                <a:spcAft>
+                  <a:spcPts val="0"/>
+                </a:spcAft>
+                <a:buClrTx/>
+                <a:buSzTx/>
+                <a:buFontTx/>
+                <a:buNone/>
+                <a:tabLst/>
+              </a:pPr>
+              <a:endParaRPr kumimoji="0" lang="en-US" sz="1000" b="0" i="0" u="none" strike="noStrike" kern="1200" cap="none" spc="0" normalizeH="0" baseline="0" noProof="0" dirty="0">
+                <a:ln>
+                  <a:noFill/>
+                </a:ln>
+                <a:solidFill>
+                  <a:prstClr val="white"/>
+                </a:solidFill>
+                <a:effectLst/>
+                <a:uLnTx/>
+                <a:uFillTx/>
+                <a:latin typeface="Arial"/>
+                <a:ea typeface="+mn-ea"/>
+                <a:cs typeface="+mn-cs"/>
+              </a:endParaRPr>
+            </a:p>
+          </p:txBody>
+        </p:sp>
+      </p:grpSp>
+      <p:grpSp>
+        <p:nvGrpSpPr>
+          <p:cNvPr id="47" name="Group 46">
+            <a:extLst>
+              <a:ext uri="{FF2B5EF4-FFF2-40B4-BE49-F238E27FC236}">
+                <a16:creationId xmlns:a16="http://schemas.microsoft.com/office/drawing/2014/main" id="{ED207EC6-E8B0-0847-969F-4ADB7168A64B}"/>
+              </a:ext>
+            </a:extLst>
+          </p:cNvPr>
+          <p:cNvGrpSpPr/>
+          <p:nvPr/>
+        </p:nvGrpSpPr>
+        <p:grpSpPr>
+          <a:xfrm>
+            <a:off x="4336071" y="3304483"/>
+            <a:ext cx="269518" cy="591014"/>
+            <a:chOff x="2696706" y="3311913"/>
+            <a:chExt cx="269518" cy="591014"/>
+          </a:xfrm>
+        </p:grpSpPr>
+        <p:cxnSp>
+          <p:nvCxnSpPr>
+            <p:cNvPr id="48" name="Straight Connector 47">
+              <a:extLst>
+                <a:ext uri="{FF2B5EF4-FFF2-40B4-BE49-F238E27FC236}">
+                  <a16:creationId xmlns:a16="http://schemas.microsoft.com/office/drawing/2014/main" id="{8119C37E-2E34-D545-B347-7F895BBAC77B}"/>
+                </a:ext>
+              </a:extLst>
+            </p:cNvPr>
+            <p:cNvCxnSpPr>
+              <a:cxnSpLocks/>
+            </p:cNvCxnSpPr>
+            <p:nvPr/>
+          </p:nvCxnSpPr>
+          <p:spPr>
+            <a:xfrm>
+              <a:off x="2918740" y="3435377"/>
+              <a:ext cx="0" cy="467550"/>
+            </a:xfrm>
+            <a:prstGeom prst="line">
+              <a:avLst/>
+            </a:prstGeom>
+            <a:ln>
+              <a:solidFill>
+                <a:srgbClr val="0000FF"/>
+              </a:solidFill>
+            </a:ln>
+            <a:effectLst/>
+          </p:spPr>
+          <p:style>
+            <a:lnRef idx="2">
+              <a:schemeClr val="accent1"/>
+            </a:lnRef>
+            <a:fillRef idx="0">
+              <a:schemeClr val="accent1"/>
+            </a:fillRef>
+            <a:effectRef idx="1">
+              <a:schemeClr val="accent1"/>
+            </a:effectRef>
+            <a:fontRef idx="minor">
+              <a:schemeClr val="tx1"/>
+            </a:fontRef>
+          </p:style>
+        </p:cxnSp>
+        <p:sp>
+          <p:nvSpPr>
+            <p:cNvPr id="49" name="Parallelogram 48">
+              <a:extLst>
+                <a:ext uri="{FF2B5EF4-FFF2-40B4-BE49-F238E27FC236}">
+                  <a16:creationId xmlns:a16="http://schemas.microsoft.com/office/drawing/2014/main" id="{A3C1C947-538B-EC48-84B2-3156774374C9}"/>
+                </a:ext>
+              </a:extLst>
+            </p:cNvPr>
+            <p:cNvSpPr/>
+            <p:nvPr/>
+          </p:nvSpPr>
+          <p:spPr>
+            <a:xfrm>
+              <a:off x="2696706" y="3311913"/>
+              <a:ext cx="269518" cy="127814"/>
+            </a:xfrm>
+            <a:prstGeom prst="parallelogram">
+              <a:avLst/>
+            </a:prstGeom>
+            <a:solidFill>
+              <a:srgbClr val="0000FF"/>
+            </a:solidFill>
+            <a:ln>
+              <a:noFill/>
+            </a:ln>
+          </p:spPr>
+          <p:style>
+            <a:lnRef idx="2">
+              <a:schemeClr val="accent1">
+                <a:shade val="50000"/>
+              </a:schemeClr>
+            </a:lnRef>
+            <a:fillRef idx="1">
+              <a:schemeClr val="accent1"/>
+            </a:fillRef>
+            <a:effectRef idx="0">
+              <a:schemeClr val="accent1"/>
+            </a:effectRef>
+            <a:fontRef idx="minor">
+              <a:schemeClr val="lt1"/>
+            </a:fontRef>
+          </p:style>
+          <p:txBody>
+            <a:bodyPr rtlCol="0" anchor="t"/>
+            <a:lstStyle/>
+            <a:p>
+              <a:pPr marL="0" marR="0" indent="0" algn="l" defTabSz="685800" rtl="0" eaLnBrk="1" fontAlgn="auto" latinLnBrk="0" hangingPunct="1">
+                <a:lnSpc>
+                  <a:spcPct val="100000"/>
+                </a:lnSpc>
+                <a:spcBef>
+                  <a:spcPts val="0"/>
+                </a:spcBef>
+                <a:spcAft>
+                  <a:spcPts val="0"/>
+                </a:spcAft>
+                <a:buClrTx/>
+                <a:buSzTx/>
+                <a:buFontTx/>
+                <a:buNone/>
+                <a:tabLst/>
+              </a:pPr>
+              <a:endParaRPr kumimoji="0" lang="en-US" sz="1000" b="0" i="0" u="none" strike="noStrike" kern="1200" cap="none" spc="0" normalizeH="0" baseline="0" noProof="0" dirty="0">
+                <a:ln>
+                  <a:noFill/>
+                </a:ln>
+                <a:solidFill>
+                  <a:prstClr val="white"/>
+                </a:solidFill>
+                <a:effectLst/>
+                <a:uLnTx/>
+                <a:uFillTx/>
+                <a:latin typeface="Arial"/>
+                <a:ea typeface="+mn-ea"/>
+                <a:cs typeface="+mn-cs"/>
+              </a:endParaRPr>
+            </a:p>
+          </p:txBody>
+        </p:sp>
+      </p:grpSp>
+      <p:sp>
+        <p:nvSpPr>
+          <p:cNvPr id="50" name="Rectangle 49">
+            <a:extLst>
+              <a:ext uri="{FF2B5EF4-FFF2-40B4-BE49-F238E27FC236}">
+                <a16:creationId xmlns:a16="http://schemas.microsoft.com/office/drawing/2014/main" id="{D1129B94-AA47-1046-851A-0A8654DCA164}"/>
+              </a:ext>
+            </a:extLst>
+          </p:cNvPr>
+          <p:cNvSpPr/>
+          <p:nvPr/>
+        </p:nvSpPr>
+        <p:spPr>
+          <a:xfrm>
+            <a:off x="4856497" y="2983234"/>
+            <a:ext cx="907962" cy="915978"/>
+          </a:xfrm>
+          <a:prstGeom prst="rect">
+            <a:avLst/>
+          </a:prstGeom>
+          <a:solidFill>
+            <a:schemeClr val="accent2">
+              <a:lumMod val="60000"/>
+              <a:lumOff val="40000"/>
+            </a:schemeClr>
+          </a:solidFill>
+          <a:ln>
+            <a:noFill/>
+          </a:ln>
+          <a:effectLst>
+            <a:outerShdw blurRad="50800" dist="38100" dir="5400000" algn="t" rotWithShape="0">
+              <a:prstClr val="black">
+                <a:alpha val="40000"/>
+              </a:prstClr>
+            </a:outerShdw>
+          </a:effectLst>
+        </p:spPr>
+        <p:style>
+          <a:lnRef idx="2">
+            <a:schemeClr val="accent1">
+              <a:shade val="50000"/>
+            </a:schemeClr>
+          </a:lnRef>
+          <a:fillRef idx="1">
+            <a:schemeClr val="accent1"/>
+          </a:fillRef>
+          <a:effectRef idx="0">
+            <a:schemeClr val="accent1"/>
+          </a:effectRef>
+          <a:fontRef idx="minor">
+            <a:schemeClr val="lt1"/>
+          </a:fontRef>
+        </p:style>
+        <p:txBody>
+          <a:bodyPr rtlCol="0" anchor="t"/>
+          <a:lstStyle/>
+          <a:p>
+            <a:pPr marL="0" marR="0" indent="0" algn="ctr" defTabSz="685800" rtl="0" eaLnBrk="1" fontAlgn="auto" latinLnBrk="0" hangingPunct="1">
+              <a:lnSpc>
+                <a:spcPct val="100000"/>
+              </a:lnSpc>
+              <a:spcBef>
+                <a:spcPts val="0"/>
+              </a:spcBef>
+              <a:spcAft>
+                <a:spcPts val="0"/>
+              </a:spcAft>
+              <a:buClrTx/>
+              <a:buSzTx/>
+              <a:buFontTx/>
+              <a:buNone/>
+              <a:tabLst/>
+            </a:pPr>
+            <a:r>
+              <a:rPr lang="en-US" sz="1100" dirty="0">
+                <a:solidFill>
+                  <a:schemeClr val="accent1">
+                    <a:lumMod val="50000"/>
+                  </a:schemeClr>
+                </a:solidFill>
+                <a:latin typeface="Arial"/>
+              </a:rPr>
+              <a:t>Executors</a:t>
+            </a:r>
+            <a:endParaRPr kumimoji="0" lang="en-US" sz="1100" b="0" i="0" u="none" strike="noStrike" kern="1200" cap="none" spc="0" normalizeH="0" baseline="0" noProof="0" dirty="0">
+              <a:ln>
+                <a:noFill/>
+              </a:ln>
+              <a:solidFill>
+                <a:schemeClr val="accent1">
+                  <a:lumMod val="50000"/>
+                </a:schemeClr>
+              </a:solidFill>
+              <a:effectLst/>
+              <a:uLnTx/>
+              <a:uFillTx/>
+              <a:latin typeface="Arial"/>
+              <a:ea typeface="+mn-ea"/>
+              <a:cs typeface="+mn-cs"/>
+            </a:endParaRPr>
+          </a:p>
+        </p:txBody>
+      </p:sp>
+      <p:grpSp>
+        <p:nvGrpSpPr>
+          <p:cNvPr id="51" name="Group 50">
+            <a:extLst>
+              <a:ext uri="{FF2B5EF4-FFF2-40B4-BE49-F238E27FC236}">
+                <a16:creationId xmlns:a16="http://schemas.microsoft.com/office/drawing/2014/main" id="{91F7C782-B740-BB47-AA36-9DF9A2A7461B}"/>
+              </a:ext>
+            </a:extLst>
+          </p:cNvPr>
+          <p:cNvGrpSpPr/>
+          <p:nvPr/>
+        </p:nvGrpSpPr>
+        <p:grpSpPr>
+          <a:xfrm>
+            <a:off x="4845448" y="3308198"/>
+            <a:ext cx="269518" cy="591014"/>
+            <a:chOff x="2696706" y="3311913"/>
+            <a:chExt cx="269518" cy="591014"/>
+          </a:xfrm>
+        </p:grpSpPr>
+        <p:cxnSp>
+          <p:nvCxnSpPr>
+            <p:cNvPr id="52" name="Straight Connector 51">
+              <a:extLst>
+                <a:ext uri="{FF2B5EF4-FFF2-40B4-BE49-F238E27FC236}">
+                  <a16:creationId xmlns:a16="http://schemas.microsoft.com/office/drawing/2014/main" id="{42236CDA-9FD8-324B-8A26-C5ED3BF3F829}"/>
+                </a:ext>
+              </a:extLst>
+            </p:cNvPr>
+            <p:cNvCxnSpPr>
+              <a:cxnSpLocks/>
+            </p:cNvCxnSpPr>
+            <p:nvPr/>
+          </p:nvCxnSpPr>
+          <p:spPr>
+            <a:xfrm>
+              <a:off x="2918740" y="3435377"/>
+              <a:ext cx="0" cy="467550"/>
+            </a:xfrm>
+            <a:prstGeom prst="line">
+              <a:avLst/>
+            </a:prstGeom>
+            <a:ln>
+              <a:solidFill>
+                <a:srgbClr val="0000FF"/>
+              </a:solidFill>
+            </a:ln>
+            <a:effectLst/>
+          </p:spPr>
+          <p:style>
+            <a:lnRef idx="2">
+              <a:schemeClr val="accent1"/>
+            </a:lnRef>
+            <a:fillRef idx="0">
+              <a:schemeClr val="accent1"/>
+            </a:fillRef>
+            <a:effectRef idx="1">
+              <a:schemeClr val="accent1"/>
+            </a:effectRef>
+            <a:fontRef idx="minor">
+              <a:schemeClr val="tx1"/>
+            </a:fontRef>
+          </p:style>
+        </p:cxnSp>
+        <p:sp>
+          <p:nvSpPr>
+            <p:cNvPr id="53" name="Parallelogram 52">
+              <a:extLst>
+                <a:ext uri="{FF2B5EF4-FFF2-40B4-BE49-F238E27FC236}">
+                  <a16:creationId xmlns:a16="http://schemas.microsoft.com/office/drawing/2014/main" id="{0CF16A2E-B07A-E941-A553-210B2C2FA85E}"/>
+                </a:ext>
+              </a:extLst>
+            </p:cNvPr>
+            <p:cNvSpPr/>
+            <p:nvPr/>
+          </p:nvSpPr>
+          <p:spPr>
+            <a:xfrm>
+              <a:off x="2696706" y="3311913"/>
+              <a:ext cx="269518" cy="127814"/>
+            </a:xfrm>
+            <a:prstGeom prst="parallelogram">
+              <a:avLst/>
+            </a:prstGeom>
+            <a:solidFill>
+              <a:srgbClr val="0000FF"/>
+            </a:solidFill>
+            <a:ln>
+              <a:noFill/>
+            </a:ln>
+          </p:spPr>
+          <p:style>
+            <a:lnRef idx="2">
+              <a:schemeClr val="accent1">
+                <a:shade val="50000"/>
+              </a:schemeClr>
+            </a:lnRef>
+            <a:fillRef idx="1">
+              <a:schemeClr val="accent1"/>
+            </a:fillRef>
+            <a:effectRef idx="0">
+              <a:schemeClr val="accent1"/>
+            </a:effectRef>
+            <a:fontRef idx="minor">
+              <a:schemeClr val="lt1"/>
+            </a:fontRef>
+          </p:style>
+          <p:txBody>
+            <a:bodyPr rtlCol="0" anchor="t"/>
+            <a:lstStyle/>
+            <a:p>
+              <a:pPr marL="0" marR="0" indent="0" algn="l" defTabSz="685800" rtl="0" eaLnBrk="1" fontAlgn="auto" latinLnBrk="0" hangingPunct="1">
+                <a:lnSpc>
+                  <a:spcPct val="100000"/>
+                </a:lnSpc>
+                <a:spcBef>
+                  <a:spcPts val="0"/>
+                </a:spcBef>
+                <a:spcAft>
+                  <a:spcPts val="0"/>
+                </a:spcAft>
+                <a:buClrTx/>
+                <a:buSzTx/>
+                <a:buFontTx/>
+                <a:buNone/>
+                <a:tabLst/>
+              </a:pPr>
+              <a:endParaRPr kumimoji="0" lang="en-US" sz="1000" b="0" i="0" u="none" strike="noStrike" kern="1200" cap="none" spc="0" normalizeH="0" baseline="0" noProof="0" dirty="0">
+                <a:ln>
+                  <a:noFill/>
+                </a:ln>
+                <a:solidFill>
+                  <a:prstClr val="white"/>
+                </a:solidFill>
+                <a:effectLst/>
+                <a:uLnTx/>
+                <a:uFillTx/>
+                <a:latin typeface="Arial"/>
+                <a:ea typeface="+mn-ea"/>
+                <a:cs typeface="+mn-cs"/>
+              </a:endParaRPr>
+            </a:p>
+          </p:txBody>
+        </p:sp>
+      </p:grpSp>
+      <p:grpSp>
+        <p:nvGrpSpPr>
+          <p:cNvPr id="54" name="Group 53">
+            <a:extLst>
+              <a:ext uri="{FF2B5EF4-FFF2-40B4-BE49-F238E27FC236}">
+                <a16:creationId xmlns:a16="http://schemas.microsoft.com/office/drawing/2014/main" id="{515676A6-3222-B24D-B155-9B5C595EB6FB}"/>
+              </a:ext>
+            </a:extLst>
+          </p:cNvPr>
+          <p:cNvGrpSpPr/>
+          <p:nvPr/>
+        </p:nvGrpSpPr>
+        <p:grpSpPr>
+          <a:xfrm>
+            <a:off x="5120509" y="3304484"/>
+            <a:ext cx="269518" cy="591014"/>
+            <a:chOff x="2696706" y="3311913"/>
+            <a:chExt cx="269518" cy="591014"/>
+          </a:xfrm>
+        </p:grpSpPr>
+        <p:cxnSp>
+          <p:nvCxnSpPr>
+            <p:cNvPr id="55" name="Straight Connector 54">
+              <a:extLst>
+                <a:ext uri="{FF2B5EF4-FFF2-40B4-BE49-F238E27FC236}">
+                  <a16:creationId xmlns:a16="http://schemas.microsoft.com/office/drawing/2014/main" id="{A51A54F4-1763-F94A-8C17-88E507205B5A}"/>
+                </a:ext>
+              </a:extLst>
+            </p:cNvPr>
+            <p:cNvCxnSpPr>
+              <a:cxnSpLocks/>
+            </p:cNvCxnSpPr>
+            <p:nvPr/>
+          </p:nvCxnSpPr>
+          <p:spPr>
+            <a:xfrm>
+              <a:off x="2918740" y="3435377"/>
+              <a:ext cx="0" cy="467550"/>
+            </a:xfrm>
+            <a:prstGeom prst="line">
+              <a:avLst/>
+            </a:prstGeom>
+            <a:ln>
+              <a:solidFill>
+                <a:srgbClr val="0000FF"/>
+              </a:solidFill>
+            </a:ln>
+            <a:effectLst/>
+          </p:spPr>
+          <p:style>
+            <a:lnRef idx="2">
+              <a:schemeClr val="accent1"/>
+            </a:lnRef>
+            <a:fillRef idx="0">
+              <a:schemeClr val="accent1"/>
+            </a:fillRef>
+            <a:effectRef idx="1">
+              <a:schemeClr val="accent1"/>
+            </a:effectRef>
+            <a:fontRef idx="minor">
+              <a:schemeClr val="tx1"/>
+            </a:fontRef>
+          </p:style>
+        </p:cxnSp>
+        <p:sp>
+          <p:nvSpPr>
+            <p:cNvPr id="56" name="Parallelogram 55">
+              <a:extLst>
+                <a:ext uri="{FF2B5EF4-FFF2-40B4-BE49-F238E27FC236}">
+                  <a16:creationId xmlns:a16="http://schemas.microsoft.com/office/drawing/2014/main" id="{2AD1E85D-9E74-8747-BB1D-4249992A3F1D}"/>
+                </a:ext>
+              </a:extLst>
+            </p:cNvPr>
+            <p:cNvSpPr/>
+            <p:nvPr/>
+          </p:nvSpPr>
+          <p:spPr>
+            <a:xfrm>
+              <a:off x="2696706" y="3311913"/>
+              <a:ext cx="269518" cy="127814"/>
+            </a:xfrm>
+            <a:prstGeom prst="parallelogram">
+              <a:avLst/>
+            </a:prstGeom>
+            <a:solidFill>
+              <a:srgbClr val="0000FF"/>
+            </a:solidFill>
+            <a:ln>
+              <a:noFill/>
+            </a:ln>
+          </p:spPr>
+          <p:style>
+            <a:lnRef idx="2">
+              <a:schemeClr val="accent1">
+                <a:shade val="50000"/>
+              </a:schemeClr>
+            </a:lnRef>
+            <a:fillRef idx="1">
+              <a:schemeClr val="accent1"/>
+            </a:fillRef>
+            <a:effectRef idx="0">
+              <a:schemeClr val="accent1"/>
+            </a:effectRef>
+            <a:fontRef idx="minor">
+              <a:schemeClr val="lt1"/>
+            </a:fontRef>
+          </p:style>
+          <p:txBody>
+            <a:bodyPr rtlCol="0" anchor="t"/>
+            <a:lstStyle/>
+            <a:p>
+              <a:pPr marL="0" marR="0" indent="0" algn="l" defTabSz="685800" rtl="0" eaLnBrk="1" fontAlgn="auto" latinLnBrk="0" hangingPunct="1">
+                <a:lnSpc>
+                  <a:spcPct val="100000"/>
+                </a:lnSpc>
+                <a:spcBef>
+                  <a:spcPts val="0"/>
+                </a:spcBef>
+                <a:spcAft>
+                  <a:spcPts val="0"/>
+                </a:spcAft>
+                <a:buClrTx/>
+                <a:buSzTx/>
+                <a:buFontTx/>
+                <a:buNone/>
+                <a:tabLst/>
+              </a:pPr>
+              <a:endParaRPr kumimoji="0" lang="en-US" sz="1000" b="0" i="0" u="none" strike="noStrike" kern="1200" cap="none" spc="0" normalizeH="0" baseline="0" noProof="0" dirty="0">
+                <a:ln>
+                  <a:noFill/>
+                </a:ln>
+                <a:solidFill>
+                  <a:prstClr val="white"/>
+                </a:solidFill>
+                <a:effectLst/>
+                <a:uLnTx/>
+                <a:uFillTx/>
+                <a:latin typeface="Arial"/>
+                <a:ea typeface="+mn-ea"/>
+                <a:cs typeface="+mn-cs"/>
+              </a:endParaRPr>
+            </a:p>
+          </p:txBody>
+        </p:sp>
+      </p:grpSp>
+      <p:grpSp>
+        <p:nvGrpSpPr>
+          <p:cNvPr id="57" name="Group 56">
+            <a:extLst>
+              <a:ext uri="{FF2B5EF4-FFF2-40B4-BE49-F238E27FC236}">
+                <a16:creationId xmlns:a16="http://schemas.microsoft.com/office/drawing/2014/main" id="{CC0DE590-38EC-4249-8D01-CFECA1B06D6B}"/>
+              </a:ext>
+            </a:extLst>
+          </p:cNvPr>
+          <p:cNvGrpSpPr/>
+          <p:nvPr/>
+        </p:nvGrpSpPr>
+        <p:grpSpPr>
+          <a:xfrm>
+            <a:off x="5410442" y="3304483"/>
+            <a:ext cx="269518" cy="591014"/>
+            <a:chOff x="2696706" y="3311913"/>
+            <a:chExt cx="269518" cy="591014"/>
+          </a:xfrm>
+        </p:grpSpPr>
+        <p:cxnSp>
+          <p:nvCxnSpPr>
+            <p:cNvPr id="58" name="Straight Connector 57">
+              <a:extLst>
+                <a:ext uri="{FF2B5EF4-FFF2-40B4-BE49-F238E27FC236}">
+                  <a16:creationId xmlns:a16="http://schemas.microsoft.com/office/drawing/2014/main" id="{D9316685-5D0C-0F43-BFD0-5F26CA98E939}"/>
+                </a:ext>
+              </a:extLst>
+            </p:cNvPr>
+            <p:cNvCxnSpPr>
+              <a:cxnSpLocks/>
+            </p:cNvCxnSpPr>
+            <p:nvPr/>
+          </p:nvCxnSpPr>
+          <p:spPr>
+            <a:xfrm>
+              <a:off x="2918740" y="3435377"/>
+              <a:ext cx="0" cy="467550"/>
+            </a:xfrm>
+            <a:prstGeom prst="line">
+              <a:avLst/>
+            </a:prstGeom>
+            <a:ln>
+              <a:solidFill>
+                <a:srgbClr val="0000FF"/>
+              </a:solidFill>
+            </a:ln>
+            <a:effectLst/>
+          </p:spPr>
+          <p:style>
+            <a:lnRef idx="2">
+              <a:schemeClr val="accent1"/>
+            </a:lnRef>
+            <a:fillRef idx="0">
+              <a:schemeClr val="accent1"/>
+            </a:fillRef>
+            <a:effectRef idx="1">
+              <a:schemeClr val="accent1"/>
+            </a:effectRef>
+            <a:fontRef idx="minor">
+              <a:schemeClr val="tx1"/>
+            </a:fontRef>
+          </p:style>
+        </p:cxnSp>
+        <p:sp>
+          <p:nvSpPr>
+            <p:cNvPr id="59" name="Parallelogram 58">
+              <a:extLst>
+                <a:ext uri="{FF2B5EF4-FFF2-40B4-BE49-F238E27FC236}">
+                  <a16:creationId xmlns:a16="http://schemas.microsoft.com/office/drawing/2014/main" id="{7F61B483-F1F2-2642-890E-3D5D6D6C86C0}"/>
+                </a:ext>
+              </a:extLst>
+            </p:cNvPr>
+            <p:cNvSpPr/>
+            <p:nvPr/>
+          </p:nvSpPr>
+          <p:spPr>
+            <a:xfrm>
+              <a:off x="2696706" y="3311913"/>
+              <a:ext cx="269518" cy="127814"/>
+            </a:xfrm>
+            <a:prstGeom prst="parallelogram">
+              <a:avLst/>
+            </a:prstGeom>
+            <a:solidFill>
+              <a:srgbClr val="0000FF"/>
+            </a:solidFill>
+            <a:ln>
+              <a:noFill/>
+            </a:ln>
+          </p:spPr>
+          <p:style>
+            <a:lnRef idx="2">
+              <a:schemeClr val="accent1">
+                <a:shade val="50000"/>
+              </a:schemeClr>
+            </a:lnRef>
+            <a:fillRef idx="1">
+              <a:schemeClr val="accent1"/>
+            </a:fillRef>
+            <a:effectRef idx="0">
+              <a:schemeClr val="accent1"/>
+            </a:effectRef>
+            <a:fontRef idx="minor">
+              <a:schemeClr val="lt1"/>
+            </a:fontRef>
+          </p:style>
+          <p:txBody>
+            <a:bodyPr rtlCol="0" anchor="t"/>
+            <a:lstStyle/>
+            <a:p>
+              <a:pPr marL="0" marR="0" indent="0" algn="l" defTabSz="685800" rtl="0" eaLnBrk="1" fontAlgn="auto" latinLnBrk="0" hangingPunct="1">
+                <a:lnSpc>
+                  <a:spcPct val="100000"/>
+                </a:lnSpc>
+                <a:spcBef>
+                  <a:spcPts val="0"/>
+                </a:spcBef>
+                <a:spcAft>
+                  <a:spcPts val="0"/>
+                </a:spcAft>
+                <a:buClrTx/>
+                <a:buSzTx/>
+                <a:buFontTx/>
+                <a:buNone/>
+                <a:tabLst/>
+              </a:pPr>
+              <a:endParaRPr kumimoji="0" lang="en-US" sz="1000" b="0" i="0" u="none" strike="noStrike" kern="1200" cap="none" spc="0" normalizeH="0" baseline="0" noProof="0" dirty="0">
+                <a:ln>
+                  <a:noFill/>
+                </a:ln>
+                <a:solidFill>
+                  <a:prstClr val="white"/>
+                </a:solidFill>
+                <a:effectLst/>
+                <a:uLnTx/>
+                <a:uFillTx/>
+                <a:latin typeface="Arial"/>
+                <a:ea typeface="+mn-ea"/>
+                <a:cs typeface="+mn-cs"/>
+              </a:endParaRPr>
+            </a:p>
+          </p:txBody>
+        </p:sp>
+      </p:grpSp>
     </p:spTree>
     <p:extLst>
       <p:ext uri="{BB962C8B-B14F-4D97-AF65-F5344CB8AC3E}">
         <p14:creationId xmlns:p14="http://schemas.microsoft.com/office/powerpoint/2010/main" val="2248072428"/>
+      </p:ext>
+    </p:extLst>
+  </p:cSld>
+  <p:clrMapOvr>
+    <a:masterClrMapping/>
+  </p:clrMapOvr>
+  <p:transition spd="med"/>
+</p:sld>
+</file>
+
+<file path=ppt/slides/slide4.xml><?xml version="1.0" encoding="utf-8"?>
+<p:sld xmlns:a="http://schemas.openxmlformats.org/drawingml/2006/main" xmlns:r="http://schemas.openxmlformats.org/officeDocument/2006/relationships" xmlns:p="http://schemas.openxmlformats.org/presentationml/2006/main">
+  <p:cSld>
+    <p:spTree>
+      <p:nvGrpSpPr>
+        <p:cNvPr id="1" name=""/>
+        <p:cNvGrpSpPr/>
+        <p:nvPr/>
+      </p:nvGrpSpPr>
+      <p:grpSpPr>
+        <a:xfrm>
+          <a:off x="0" y="0"/>
+          <a:ext cx="0" cy="0"/>
+          <a:chOff x="0" y="0"/>
+          <a:chExt cx="0" cy="0"/>
+        </a:xfrm>
+      </p:grpSpPr>
+      <p:sp>
+        <p:nvSpPr>
+          <p:cNvPr id="2" name="Title 1">
+            <a:extLst>
+              <a:ext uri="{FF2B5EF4-FFF2-40B4-BE49-F238E27FC236}">
+                <a16:creationId xmlns:a16="http://schemas.microsoft.com/office/drawing/2014/main" id="{BCB6DAFD-EE59-8444-A912-48B37E4C5A1A}"/>
+              </a:ext>
+            </a:extLst>
+          </p:cNvPr>
+          <p:cNvSpPr>
+            <a:spLocks noGrp="1"/>
+          </p:cNvSpPr>
+          <p:nvPr>
+            <p:ph type="title"/>
+          </p:nvPr>
+        </p:nvSpPr>
+        <p:spPr/>
+        <p:txBody>
+          <a:bodyPr/>
+          <a:lstStyle/>
+          <a:p>
+            <a:endParaRPr lang="en-US"/>
+          </a:p>
+        </p:txBody>
+      </p:sp>
+      <p:sp>
+        <p:nvSpPr>
+          <p:cNvPr id="3" name="Text Placeholder 2">
+            <a:extLst>
+              <a:ext uri="{FF2B5EF4-FFF2-40B4-BE49-F238E27FC236}">
+                <a16:creationId xmlns:a16="http://schemas.microsoft.com/office/drawing/2014/main" id="{81707584-8A17-A549-8364-BF857A6C4299}"/>
+              </a:ext>
+            </a:extLst>
+          </p:cNvPr>
+          <p:cNvSpPr>
+            <a:spLocks noGrp="1"/>
+          </p:cNvSpPr>
+          <p:nvPr>
+            <p:ph type="body" idx="1"/>
+          </p:nvPr>
+        </p:nvSpPr>
+        <p:spPr/>
+        <p:txBody>
+          <a:bodyPr/>
+          <a:lstStyle/>
+          <a:p>
+            <a:endParaRPr lang="en-US"/>
+          </a:p>
+        </p:txBody>
+      </p:sp>
+      <p:sp>
+        <p:nvSpPr>
+          <p:cNvPr id="4" name="Slide Number Placeholder 3">
+            <a:extLst>
+              <a:ext uri="{FF2B5EF4-FFF2-40B4-BE49-F238E27FC236}">
+                <a16:creationId xmlns:a16="http://schemas.microsoft.com/office/drawing/2014/main" id="{DF73E302-D7AE-E24B-BD37-ACBBBE09C440}"/>
+              </a:ext>
+            </a:extLst>
+          </p:cNvPr>
+          <p:cNvSpPr>
+            <a:spLocks noGrp="1"/>
+          </p:cNvSpPr>
+          <p:nvPr>
+            <p:ph type="sldNum" sz="quarter" idx="2"/>
+          </p:nvPr>
+        </p:nvSpPr>
+        <p:spPr/>
+        <p:txBody>
+          <a:bodyPr/>
+          <a:lstStyle/>
+          <a:p>
+            <a:fld id="{86CB4B4D-7CA3-9044-876B-883B54F8677D}" type="slidenum">
+              <a:rPr lang="en-US" smtClean="0"/>
+              <a:pPr/>
+              <a:t>4</a:t>
+            </a:fld>
+            <a:endParaRPr lang="en-US"/>
+          </a:p>
+        </p:txBody>
+      </p:sp>
+    </p:spTree>
+    <p:extLst>
+      <p:ext uri="{BB962C8B-B14F-4D97-AF65-F5344CB8AC3E}">
+        <p14:creationId xmlns:p14="http://schemas.microsoft.com/office/powerpoint/2010/main" val="3904071997"/>
       </p:ext>
     </p:extLst>
   </p:cSld>

</xml_diff>